<commit_message>
Scenario presentation completed + rasd v2 update
</commit_message>
<xml_diff>
--- a/OtherStuff/Presentation/Non fun req + Scenarios + mockups.pptx
+++ b/OtherStuff/Presentation/Non fun req + Scenarios + mockups.pptx
@@ -9,6 +9,12 @@
     <p:sldId id="258" r:id="rId3"/>
     <p:sldId id="259" r:id="rId4"/>
     <p:sldId id="260" r:id="rId5"/>
+    <p:sldId id="261" r:id="rId6"/>
+    <p:sldId id="262" r:id="rId7"/>
+    <p:sldId id="263" r:id="rId8"/>
+    <p:sldId id="264" r:id="rId9"/>
+    <p:sldId id="265" r:id="rId10"/>
+    <p:sldId id="266" r:id="rId11"/>
   </p:sldIdLst>
   <p:sldSz cx="9144000" cy="6858000" type="screen4x3"/>
   <p:notesSz cx="6858000" cy="9144000"/>
@@ -243,7 +249,7 @@
               <a:rPr lang="it-IT" smtClean="0"/>
               <a:t>08/11/2015</a:t>
             </a:fld>
-            <a:endParaRPr lang="it-IT"/>
+            <a:endParaRPr lang="it-IT" dirty="0"/>
           </a:p>
         </p:txBody>
       </p:sp>
@@ -262,7 +268,7 @@
           <a:bodyPr/>
           <a:lstStyle/>
           <a:p>
-            <a:endParaRPr lang="it-IT"/>
+            <a:endParaRPr lang="it-IT" dirty="0"/>
           </a:p>
         </p:txBody>
       </p:sp>
@@ -285,7 +291,7 @@
               <a:rPr lang="it-IT" smtClean="0"/>
               <a:t>‹N›</a:t>
             </a:fld>
-            <a:endParaRPr lang="it-IT"/>
+            <a:endParaRPr lang="it-IT" dirty="0"/>
           </a:p>
         </p:txBody>
       </p:sp>
@@ -413,7 +419,7 @@
               <a:rPr lang="it-IT" smtClean="0"/>
               <a:t>08/11/2015</a:t>
             </a:fld>
-            <a:endParaRPr lang="it-IT"/>
+            <a:endParaRPr lang="it-IT" dirty="0"/>
           </a:p>
         </p:txBody>
       </p:sp>
@@ -432,7 +438,7 @@
           <a:bodyPr/>
           <a:lstStyle/>
           <a:p>
-            <a:endParaRPr lang="it-IT"/>
+            <a:endParaRPr lang="it-IT" dirty="0"/>
           </a:p>
         </p:txBody>
       </p:sp>
@@ -455,7 +461,7 @@
               <a:rPr lang="it-IT" smtClean="0"/>
               <a:t>‹N›</a:t>
             </a:fld>
-            <a:endParaRPr lang="it-IT"/>
+            <a:endParaRPr lang="it-IT" dirty="0"/>
           </a:p>
         </p:txBody>
       </p:sp>
@@ -593,7 +599,7 @@
               <a:rPr lang="it-IT" smtClean="0"/>
               <a:t>08/11/2015</a:t>
             </a:fld>
-            <a:endParaRPr lang="it-IT"/>
+            <a:endParaRPr lang="it-IT" dirty="0"/>
           </a:p>
         </p:txBody>
       </p:sp>
@@ -612,7 +618,7 @@
           <a:bodyPr/>
           <a:lstStyle/>
           <a:p>
-            <a:endParaRPr lang="it-IT"/>
+            <a:endParaRPr lang="it-IT" dirty="0"/>
           </a:p>
         </p:txBody>
       </p:sp>
@@ -635,7 +641,7 @@
               <a:rPr lang="it-IT" smtClean="0"/>
               <a:t>‹N›</a:t>
             </a:fld>
-            <a:endParaRPr lang="it-IT"/>
+            <a:endParaRPr lang="it-IT" dirty="0"/>
           </a:p>
         </p:txBody>
       </p:sp>
@@ -763,7 +769,7 @@
               <a:rPr lang="it-IT" smtClean="0"/>
               <a:t>08/11/2015</a:t>
             </a:fld>
-            <a:endParaRPr lang="it-IT"/>
+            <a:endParaRPr lang="it-IT" dirty="0"/>
           </a:p>
         </p:txBody>
       </p:sp>
@@ -782,7 +788,7 @@
           <a:bodyPr/>
           <a:lstStyle/>
           <a:p>
-            <a:endParaRPr lang="it-IT"/>
+            <a:endParaRPr lang="it-IT" dirty="0"/>
           </a:p>
         </p:txBody>
       </p:sp>
@@ -805,7 +811,7 @@
               <a:rPr lang="it-IT" smtClean="0"/>
               <a:t>‹N›</a:t>
             </a:fld>
-            <a:endParaRPr lang="it-IT"/>
+            <a:endParaRPr lang="it-IT" dirty="0"/>
           </a:p>
         </p:txBody>
       </p:sp>
@@ -1007,7 +1013,7 @@
               <a:rPr lang="it-IT" smtClean="0"/>
               <a:t>08/11/2015</a:t>
             </a:fld>
-            <a:endParaRPr lang="it-IT"/>
+            <a:endParaRPr lang="it-IT" dirty="0"/>
           </a:p>
         </p:txBody>
       </p:sp>
@@ -1026,7 +1032,7 @@
           <a:bodyPr/>
           <a:lstStyle/>
           <a:p>
-            <a:endParaRPr lang="it-IT"/>
+            <a:endParaRPr lang="it-IT" dirty="0"/>
           </a:p>
         </p:txBody>
       </p:sp>
@@ -1049,7 +1055,7 @@
               <a:rPr lang="it-IT" smtClean="0"/>
               <a:t>‹N›</a:t>
             </a:fld>
-            <a:endParaRPr lang="it-IT"/>
+            <a:endParaRPr lang="it-IT" dirty="0"/>
           </a:p>
         </p:txBody>
       </p:sp>
@@ -1239,7 +1245,7 @@
               <a:rPr lang="it-IT" smtClean="0"/>
               <a:t>08/11/2015</a:t>
             </a:fld>
-            <a:endParaRPr lang="it-IT"/>
+            <a:endParaRPr lang="it-IT" dirty="0"/>
           </a:p>
         </p:txBody>
       </p:sp>
@@ -1258,7 +1264,7 @@
           <a:bodyPr/>
           <a:lstStyle/>
           <a:p>
-            <a:endParaRPr lang="it-IT"/>
+            <a:endParaRPr lang="it-IT" dirty="0"/>
           </a:p>
         </p:txBody>
       </p:sp>
@@ -1281,7 +1287,7 @@
               <a:rPr lang="it-IT" smtClean="0"/>
               <a:t>‹N›</a:t>
             </a:fld>
-            <a:endParaRPr lang="it-IT"/>
+            <a:endParaRPr lang="it-IT" dirty="0"/>
           </a:p>
         </p:txBody>
       </p:sp>
@@ -1606,7 +1612,7 @@
               <a:rPr lang="it-IT" smtClean="0"/>
               <a:t>08/11/2015</a:t>
             </a:fld>
-            <a:endParaRPr lang="it-IT"/>
+            <a:endParaRPr lang="it-IT" dirty="0"/>
           </a:p>
         </p:txBody>
       </p:sp>
@@ -1625,7 +1631,7 @@
           <a:bodyPr/>
           <a:lstStyle/>
           <a:p>
-            <a:endParaRPr lang="it-IT"/>
+            <a:endParaRPr lang="it-IT" dirty="0"/>
           </a:p>
         </p:txBody>
       </p:sp>
@@ -1648,7 +1654,7 @@
               <a:rPr lang="it-IT" smtClean="0"/>
               <a:t>‹N›</a:t>
             </a:fld>
-            <a:endParaRPr lang="it-IT"/>
+            <a:endParaRPr lang="it-IT" dirty="0"/>
           </a:p>
         </p:txBody>
       </p:sp>
@@ -1724,7 +1730,7 @@
               <a:rPr lang="it-IT" smtClean="0"/>
               <a:t>08/11/2015</a:t>
             </a:fld>
-            <a:endParaRPr lang="it-IT"/>
+            <a:endParaRPr lang="it-IT" dirty="0"/>
           </a:p>
         </p:txBody>
       </p:sp>
@@ -1743,7 +1749,7 @@
           <a:bodyPr/>
           <a:lstStyle/>
           <a:p>
-            <a:endParaRPr lang="it-IT"/>
+            <a:endParaRPr lang="it-IT" dirty="0"/>
           </a:p>
         </p:txBody>
       </p:sp>
@@ -1766,7 +1772,7 @@
               <a:rPr lang="it-IT" smtClean="0"/>
               <a:t>‹N›</a:t>
             </a:fld>
-            <a:endParaRPr lang="it-IT"/>
+            <a:endParaRPr lang="it-IT" dirty="0"/>
           </a:p>
         </p:txBody>
       </p:sp>
@@ -1819,7 +1825,7 @@
               <a:rPr lang="it-IT" smtClean="0"/>
               <a:t>08/11/2015</a:t>
             </a:fld>
-            <a:endParaRPr lang="it-IT"/>
+            <a:endParaRPr lang="it-IT" dirty="0"/>
           </a:p>
         </p:txBody>
       </p:sp>
@@ -1838,7 +1844,7 @@
           <a:bodyPr/>
           <a:lstStyle/>
           <a:p>
-            <a:endParaRPr lang="it-IT"/>
+            <a:endParaRPr lang="it-IT" dirty="0"/>
           </a:p>
         </p:txBody>
       </p:sp>
@@ -1861,7 +1867,7 @@
               <a:rPr lang="it-IT" smtClean="0"/>
               <a:t>‹N›</a:t>
             </a:fld>
-            <a:endParaRPr lang="it-IT"/>
+            <a:endParaRPr lang="it-IT" dirty="0"/>
           </a:p>
         </p:txBody>
       </p:sp>
@@ -2096,7 +2102,7 @@
               <a:rPr lang="it-IT" smtClean="0"/>
               <a:t>08/11/2015</a:t>
             </a:fld>
-            <a:endParaRPr lang="it-IT"/>
+            <a:endParaRPr lang="it-IT" dirty="0"/>
           </a:p>
         </p:txBody>
       </p:sp>
@@ -2115,7 +2121,7 @@
           <a:bodyPr/>
           <a:lstStyle/>
           <a:p>
-            <a:endParaRPr lang="it-IT"/>
+            <a:endParaRPr lang="it-IT" dirty="0"/>
           </a:p>
         </p:txBody>
       </p:sp>
@@ -2138,7 +2144,7 @@
               <a:rPr lang="it-IT" smtClean="0"/>
               <a:t>‹N›</a:t>
             </a:fld>
-            <a:endParaRPr lang="it-IT"/>
+            <a:endParaRPr lang="it-IT" dirty="0"/>
           </a:p>
         </p:txBody>
       </p:sp>
@@ -2262,7 +2268,7 @@
           </a:lstStyle>
           <a:p>
             <a:r>
-              <a:rPr lang="it-IT" smtClean="0"/>
+              <a:rPr lang="it-IT" dirty="0" smtClean="0"/>
               <a:t>Fare clic sull'icona per inserire un'immagine</a:t>
             </a:r>
             <a:endParaRPr lang="en-US" dirty="0"/>
@@ -2353,7 +2359,7 @@
               <a:rPr lang="it-IT" smtClean="0"/>
               <a:t>08/11/2015</a:t>
             </a:fld>
-            <a:endParaRPr lang="it-IT"/>
+            <a:endParaRPr lang="it-IT" dirty="0"/>
           </a:p>
         </p:txBody>
       </p:sp>
@@ -2372,7 +2378,7 @@
           <a:bodyPr/>
           <a:lstStyle/>
           <a:p>
-            <a:endParaRPr lang="it-IT"/>
+            <a:endParaRPr lang="it-IT" dirty="0"/>
           </a:p>
         </p:txBody>
       </p:sp>
@@ -2395,7 +2401,7 @@
               <a:rPr lang="it-IT" smtClean="0"/>
               <a:t>‹N›</a:t>
             </a:fld>
-            <a:endParaRPr lang="it-IT"/>
+            <a:endParaRPr lang="it-IT" dirty="0"/>
           </a:p>
         </p:txBody>
       </p:sp>
@@ -2566,7 +2572,7 @@
               <a:rPr lang="it-IT" smtClean="0"/>
               <a:t>08/11/2015</a:t>
             </a:fld>
-            <a:endParaRPr lang="it-IT"/>
+            <a:endParaRPr lang="it-IT" dirty="0"/>
           </a:p>
         </p:txBody>
       </p:sp>
@@ -2603,7 +2609,7 @@
             </a:lvl1pPr>
           </a:lstStyle>
           <a:p>
-            <a:endParaRPr lang="it-IT"/>
+            <a:endParaRPr lang="it-IT" dirty="0"/>
           </a:p>
         </p:txBody>
       </p:sp>
@@ -2644,7 +2650,7 @@
               <a:rPr lang="it-IT" smtClean="0"/>
               <a:t>‹N›</a:t>
             </a:fld>
-            <a:endParaRPr lang="it-IT"/>
+            <a:endParaRPr lang="it-IT" dirty="0"/>
           </a:p>
         </p:txBody>
       </p:sp>
@@ -3483,6 +3489,1206 @@
 </p:sld>
 </file>
 
+<file path=ppt/slides/slide10.xml><?xml version="1.0" encoding="utf-8"?>
+<p:sld xmlns:a="http://schemas.openxmlformats.org/drawingml/2006/main" xmlns:r="http://schemas.openxmlformats.org/officeDocument/2006/relationships" xmlns:p="http://schemas.openxmlformats.org/presentationml/2006/main">
+  <p:cSld>
+    <p:spTree>
+      <p:nvGrpSpPr>
+        <p:cNvPr id="1" name=""/>
+        <p:cNvGrpSpPr/>
+        <p:nvPr/>
+      </p:nvGrpSpPr>
+      <p:grpSpPr>
+        <a:xfrm>
+          <a:off x="0" y="0"/>
+          <a:ext cx="0" cy="0"/>
+          <a:chOff x="0" y="0"/>
+          <a:chExt cx="0" cy="0"/>
+        </a:xfrm>
+      </p:grpSpPr>
+      <p:sp>
+        <p:nvSpPr>
+          <p:cNvPr id="4" name="CasellaDiTesto 3"/>
+          <p:cNvSpPr txBox="1"/>
+          <p:nvPr/>
+        </p:nvSpPr>
+        <p:spPr>
+          <a:xfrm>
+            <a:off x="836023" y="644434"/>
+            <a:ext cx="7480663" cy="923330"/>
+          </a:xfrm>
+          <a:prstGeom prst="rect">
+            <a:avLst/>
+          </a:prstGeom>
+          <a:noFill/>
+        </p:spPr>
+        <p:txBody>
+          <a:bodyPr wrap="square" rtlCol="0">
+            <a:spAutoFit/>
+          </a:bodyPr>
+          <a:lstStyle/>
+          <a:p>
+            <a:r>
+              <a:rPr lang="en-US" dirty="0" smtClean="0">
+                <a:latin typeface="Georgia" panose="02040502050405020303" pitchFamily="18" charset="0"/>
+              </a:rPr>
+              <a:t>Early in the morning, the day of Luca’s exam, the taxi driver Mario Rossi is starting his </a:t>
+            </a:r>
+            <a:r>
+              <a:rPr lang="en-US" dirty="0" err="1" smtClean="0">
+                <a:latin typeface="Georgia" panose="02040502050405020303" pitchFamily="18" charset="0"/>
+              </a:rPr>
+              <a:t>workshift</a:t>
+            </a:r>
+            <a:r>
+              <a:rPr lang="en-US" dirty="0" smtClean="0">
+                <a:latin typeface="Georgia" panose="02040502050405020303" pitchFamily="18" charset="0"/>
+              </a:rPr>
+              <a:t>. Mario enters his taxi and opens MTS’s app on his mobile phone.</a:t>
+            </a:r>
+            <a:endParaRPr lang="en-US" dirty="0">
+              <a:latin typeface="Georgia" panose="02040502050405020303" pitchFamily="18" charset="0"/>
+            </a:endParaRPr>
+          </a:p>
+        </p:txBody>
+      </p:sp>
+      <p:pic>
+        <p:nvPicPr>
+          <p:cNvPr id="5" name="Segnaposto contenuto 4" descr="C:\Users\Alessandro\Google Drive\Politecnico (MAGISTRALE)\SOFTWARE ENGINNEERING 2\PROGETTO\Project images\Mobile\MobileHome.png"/>
+          <p:cNvPicPr>
+            <a:picLocks noGrp="1"/>
+          </p:cNvPicPr>
+          <p:nvPr>
+            <p:ph idx="1"/>
+          </p:nvPr>
+        </p:nvPicPr>
+        <p:blipFill>
+          <a:blip r:embed="rId2">
+            <a:extLst>
+              <a:ext uri="{28A0092B-C50C-407E-A947-70E740481C1C}">
+                <a14:useLocalDpi xmlns:a14="http://schemas.microsoft.com/office/drawing/2010/main" val="0"/>
+              </a:ext>
+            </a:extLst>
+          </a:blip>
+          <a:srcRect/>
+          <a:stretch>
+            <a:fillRect/>
+          </a:stretch>
+        </p:blipFill>
+        <p:spPr bwMode="auto">
+          <a:xfrm>
+            <a:off x="1375955" y="1828778"/>
+            <a:ext cx="2324100" cy="3752850"/>
+          </a:xfrm>
+          <a:prstGeom prst="rect">
+            <a:avLst/>
+          </a:prstGeom>
+          <a:noFill/>
+          <a:ln>
+            <a:noFill/>
+          </a:ln>
+        </p:spPr>
+      </p:pic>
+      <p:sp>
+        <p:nvSpPr>
+          <p:cNvPr id="6" name="CasellaDiTesto 5"/>
+          <p:cNvSpPr txBox="1"/>
+          <p:nvPr/>
+        </p:nvSpPr>
+        <p:spPr>
+          <a:xfrm>
+            <a:off x="4306389" y="1837465"/>
+            <a:ext cx="3870960" cy="4524315"/>
+          </a:xfrm>
+          <a:prstGeom prst="rect">
+            <a:avLst/>
+          </a:prstGeom>
+          <a:noFill/>
+        </p:spPr>
+        <p:txBody>
+          <a:bodyPr wrap="square" rtlCol="0">
+            <a:spAutoFit/>
+          </a:bodyPr>
+          <a:lstStyle/>
+          <a:p>
+            <a:r>
+              <a:rPr lang="en-US" dirty="0" smtClean="0">
+                <a:latin typeface="Georgia" panose="02040502050405020303" pitchFamily="18" charset="0"/>
+              </a:rPr>
+              <a:t>He inserts his driver’s account information in the home and logs in.</a:t>
+            </a:r>
+          </a:p>
+          <a:p>
+            <a:r>
+              <a:rPr lang="en-US" dirty="0" smtClean="0">
+                <a:latin typeface="Georgia" panose="02040502050405020303" pitchFamily="18" charset="0"/>
+              </a:rPr>
+              <a:t>Now he is about to turn on the engine when he sees that the system has already a ride request for him.</a:t>
+            </a:r>
+          </a:p>
+          <a:p>
+            <a:r>
+              <a:rPr lang="en-US" dirty="0" smtClean="0">
+                <a:latin typeface="Georgia" panose="02040502050405020303" pitchFamily="18" charset="0"/>
+              </a:rPr>
+              <a:t>Mario taps on “See request”, and the details appear on his phone’s screen.</a:t>
+            </a:r>
+          </a:p>
+          <a:p>
+            <a:r>
+              <a:rPr lang="en-US" dirty="0" smtClean="0">
+                <a:latin typeface="Georgia" panose="02040502050405020303" pitchFamily="18" charset="0"/>
+              </a:rPr>
+              <a:t>He then decide to accept the request, and he taps on the green button. </a:t>
+            </a:r>
+          </a:p>
+          <a:p>
+            <a:r>
+              <a:rPr lang="en-US" dirty="0" smtClean="0">
+                <a:latin typeface="Georgia" panose="02040502050405020303" pitchFamily="18" charset="0"/>
+              </a:rPr>
+              <a:t>The app is now displaying all the required information, and Mario can easily reach Luca’s home.</a:t>
+            </a:r>
+          </a:p>
+          <a:p>
+            <a:endParaRPr lang="en-US" dirty="0">
+              <a:latin typeface="Georgia" panose="02040502050405020303" pitchFamily="18" charset="0"/>
+            </a:endParaRPr>
+          </a:p>
+        </p:txBody>
+      </p:sp>
+      <p:pic>
+        <p:nvPicPr>
+          <p:cNvPr id="7" name="Immagine 6" descr="C:\Users\Alessandro\Desktop\Ale\GitHubSynch\myTaxyService-SE2-PozziRomani\OtherStuff\Mockups\MobileTaxiDriverHome.png"/>
+          <p:cNvPicPr/>
+          <p:nvPr/>
+        </p:nvPicPr>
+        <p:blipFill>
+          <a:blip r:embed="rId3">
+            <a:extLst>
+              <a:ext uri="{28A0092B-C50C-407E-A947-70E740481C1C}">
+                <a14:useLocalDpi xmlns:a14="http://schemas.microsoft.com/office/drawing/2010/main" val="0"/>
+              </a:ext>
+            </a:extLst>
+          </a:blip>
+          <a:srcRect/>
+          <a:stretch>
+            <a:fillRect/>
+          </a:stretch>
+        </p:blipFill>
+        <p:spPr bwMode="auto">
+          <a:xfrm>
+            <a:off x="1375955" y="1828778"/>
+            <a:ext cx="2324100" cy="3752850"/>
+          </a:xfrm>
+          <a:prstGeom prst="rect">
+            <a:avLst/>
+          </a:prstGeom>
+          <a:noFill/>
+          <a:ln>
+            <a:noFill/>
+          </a:ln>
+        </p:spPr>
+      </p:pic>
+      <p:pic>
+        <p:nvPicPr>
+          <p:cNvPr id="8" name="Immagine 7" descr="C:\Users\Alessandro\Desktop\Ale\GitHubSynch\myTaxyService-SE2-PozziRomani\OtherStuff\Mockups\MobileTaxiDriverRequestDetails.png"/>
+          <p:cNvPicPr/>
+          <p:nvPr/>
+        </p:nvPicPr>
+        <p:blipFill>
+          <a:blip r:embed="rId4">
+            <a:extLst>
+              <a:ext uri="{28A0092B-C50C-407E-A947-70E740481C1C}">
+                <a14:useLocalDpi xmlns:a14="http://schemas.microsoft.com/office/drawing/2010/main" val="0"/>
+              </a:ext>
+            </a:extLst>
+          </a:blip>
+          <a:srcRect/>
+          <a:stretch>
+            <a:fillRect/>
+          </a:stretch>
+        </p:blipFill>
+        <p:spPr bwMode="auto">
+          <a:xfrm>
+            <a:off x="1375955" y="1828778"/>
+            <a:ext cx="2311037" cy="3744163"/>
+          </a:xfrm>
+          <a:prstGeom prst="rect">
+            <a:avLst/>
+          </a:prstGeom>
+          <a:noFill/>
+          <a:ln>
+            <a:noFill/>
+          </a:ln>
+        </p:spPr>
+      </p:pic>
+      <p:pic>
+        <p:nvPicPr>
+          <p:cNvPr id="9" name="Immagine 8" descr="C:\Users\Alessandro\Google Drive\Politecnico (MAGISTRALE)\SOFTWARE ENGINNEERING 2\PROGETTO\Project images\MobileTaxiDriverRideStatus.png"/>
+          <p:cNvPicPr/>
+          <p:nvPr/>
+        </p:nvPicPr>
+        <p:blipFill>
+          <a:blip r:embed="rId5">
+            <a:extLst>
+              <a:ext uri="{28A0092B-C50C-407E-A947-70E740481C1C}">
+                <a14:useLocalDpi xmlns:a14="http://schemas.microsoft.com/office/drawing/2010/main" val="0"/>
+              </a:ext>
+            </a:extLst>
+          </a:blip>
+          <a:srcRect/>
+          <a:stretch>
+            <a:fillRect/>
+          </a:stretch>
+        </p:blipFill>
+        <p:spPr bwMode="auto">
+          <a:xfrm>
+            <a:off x="1375954" y="1872684"/>
+            <a:ext cx="2311037" cy="3713287"/>
+          </a:xfrm>
+          <a:prstGeom prst="rect">
+            <a:avLst/>
+          </a:prstGeom>
+          <a:noFill/>
+          <a:ln>
+            <a:noFill/>
+          </a:ln>
+        </p:spPr>
+      </p:pic>
+    </p:spTree>
+    <p:extLst>
+      <p:ext uri="{BB962C8B-B14F-4D97-AF65-F5344CB8AC3E}">
+        <p14:creationId xmlns:p14="http://schemas.microsoft.com/office/powerpoint/2010/main" val="3209154581"/>
+      </p:ext>
+    </p:extLst>
+  </p:cSld>
+  <p:clrMapOvr>
+    <a:masterClrMapping/>
+  </p:clrMapOvr>
+  <p:timing>
+    <p:tnLst>
+      <p:par>
+        <p:cTn id="1" dur="indefinite" restart="never" nodeType="tmRoot">
+          <p:childTnLst>
+            <p:seq concurrent="1" nextAc="seek">
+              <p:cTn id="2" dur="indefinite" nodeType="mainSeq">
+                <p:childTnLst>
+                  <p:par>
+                    <p:cTn id="3" fill="hold">
+                      <p:stCondLst>
+                        <p:cond delay="indefinite"/>
+                      </p:stCondLst>
+                      <p:childTnLst>
+                        <p:par>
+                          <p:cTn id="4" fill="hold">
+                            <p:stCondLst>
+                              <p:cond delay="0"/>
+                            </p:stCondLst>
+                            <p:childTnLst>
+                              <p:par>
+                                <p:cTn id="5" presetID="53" presetClass="entr" presetSubtype="16" fill="hold" nodeType="clickEffect">
+                                  <p:stCondLst>
+                                    <p:cond delay="0"/>
+                                  </p:stCondLst>
+                                  <p:childTnLst>
+                                    <p:set>
+                                      <p:cBhvr>
+                                        <p:cTn id="6" dur="1" fill="hold">
+                                          <p:stCondLst>
+                                            <p:cond delay="0"/>
+                                          </p:stCondLst>
+                                        </p:cTn>
+                                        <p:tgtEl>
+                                          <p:spTgt spid="5"/>
+                                        </p:tgtEl>
+                                        <p:attrNameLst>
+                                          <p:attrName>style.visibility</p:attrName>
+                                        </p:attrNameLst>
+                                      </p:cBhvr>
+                                      <p:to>
+                                        <p:strVal val="visible"/>
+                                      </p:to>
+                                    </p:set>
+                                    <p:anim calcmode="lin" valueType="num">
+                                      <p:cBhvr>
+                                        <p:cTn id="7" dur="500" fill="hold"/>
+                                        <p:tgtEl>
+                                          <p:spTgt spid="5"/>
+                                        </p:tgtEl>
+                                        <p:attrNameLst>
+                                          <p:attrName>ppt_w</p:attrName>
+                                        </p:attrNameLst>
+                                      </p:cBhvr>
+                                      <p:tavLst>
+                                        <p:tav tm="0">
+                                          <p:val>
+                                            <p:fltVal val="0"/>
+                                          </p:val>
+                                        </p:tav>
+                                        <p:tav tm="100000">
+                                          <p:val>
+                                            <p:strVal val="#ppt_w"/>
+                                          </p:val>
+                                        </p:tav>
+                                      </p:tavLst>
+                                    </p:anim>
+                                    <p:anim calcmode="lin" valueType="num">
+                                      <p:cBhvr>
+                                        <p:cTn id="8" dur="500" fill="hold"/>
+                                        <p:tgtEl>
+                                          <p:spTgt spid="5"/>
+                                        </p:tgtEl>
+                                        <p:attrNameLst>
+                                          <p:attrName>ppt_h</p:attrName>
+                                        </p:attrNameLst>
+                                      </p:cBhvr>
+                                      <p:tavLst>
+                                        <p:tav tm="0">
+                                          <p:val>
+                                            <p:fltVal val="0"/>
+                                          </p:val>
+                                        </p:tav>
+                                        <p:tav tm="100000">
+                                          <p:val>
+                                            <p:strVal val="#ppt_h"/>
+                                          </p:val>
+                                        </p:tav>
+                                      </p:tavLst>
+                                    </p:anim>
+                                    <p:animEffect transition="in" filter="fade">
+                                      <p:cBhvr>
+                                        <p:cTn id="9" dur="500"/>
+                                        <p:tgtEl>
+                                          <p:spTgt spid="5"/>
+                                        </p:tgtEl>
+                                      </p:cBhvr>
+                                    </p:animEffect>
+                                  </p:childTnLst>
+                                </p:cTn>
+                              </p:par>
+                            </p:childTnLst>
+                          </p:cTn>
+                        </p:par>
+                      </p:childTnLst>
+                    </p:cTn>
+                  </p:par>
+                  <p:par>
+                    <p:cTn id="10" fill="hold">
+                      <p:stCondLst>
+                        <p:cond delay="indefinite"/>
+                      </p:stCondLst>
+                      <p:childTnLst>
+                        <p:par>
+                          <p:cTn id="11" fill="hold">
+                            <p:stCondLst>
+                              <p:cond delay="0"/>
+                            </p:stCondLst>
+                            <p:childTnLst>
+                              <p:par>
+                                <p:cTn id="12" presetID="10" presetClass="entr" presetSubtype="0" fill="hold" nodeType="clickEffect">
+                                  <p:stCondLst>
+                                    <p:cond delay="0"/>
+                                  </p:stCondLst>
+                                  <p:childTnLst>
+                                    <p:set>
+                                      <p:cBhvr>
+                                        <p:cTn id="13" dur="1" fill="hold">
+                                          <p:stCondLst>
+                                            <p:cond delay="0"/>
+                                          </p:stCondLst>
+                                        </p:cTn>
+                                        <p:tgtEl>
+                                          <p:spTgt spid="6">
+                                            <p:txEl>
+                                              <p:pRg st="0" end="0"/>
+                                            </p:txEl>
+                                          </p:spTgt>
+                                        </p:tgtEl>
+                                        <p:attrNameLst>
+                                          <p:attrName>style.visibility</p:attrName>
+                                        </p:attrNameLst>
+                                      </p:cBhvr>
+                                      <p:to>
+                                        <p:strVal val="visible"/>
+                                      </p:to>
+                                    </p:set>
+                                    <p:animEffect transition="in" filter="fade">
+                                      <p:cBhvr>
+                                        <p:cTn id="14" dur="500"/>
+                                        <p:tgtEl>
+                                          <p:spTgt spid="6">
+                                            <p:txEl>
+                                              <p:pRg st="0" end="0"/>
+                                            </p:txEl>
+                                          </p:spTgt>
+                                        </p:tgtEl>
+                                      </p:cBhvr>
+                                    </p:animEffect>
+                                  </p:childTnLst>
+                                </p:cTn>
+                              </p:par>
+                            </p:childTnLst>
+                          </p:cTn>
+                        </p:par>
+                      </p:childTnLst>
+                    </p:cTn>
+                  </p:par>
+                  <p:par>
+                    <p:cTn id="15" fill="hold">
+                      <p:stCondLst>
+                        <p:cond delay="indefinite"/>
+                      </p:stCondLst>
+                      <p:childTnLst>
+                        <p:par>
+                          <p:cTn id="16" fill="hold">
+                            <p:stCondLst>
+                              <p:cond delay="0"/>
+                            </p:stCondLst>
+                            <p:childTnLst>
+                              <p:par>
+                                <p:cTn id="17" presetID="53" presetClass="exit" presetSubtype="32" fill="hold" nodeType="clickEffect">
+                                  <p:stCondLst>
+                                    <p:cond delay="0"/>
+                                  </p:stCondLst>
+                                  <p:childTnLst>
+                                    <p:anim calcmode="lin" valueType="num">
+                                      <p:cBhvr>
+                                        <p:cTn id="18" dur="500"/>
+                                        <p:tgtEl>
+                                          <p:spTgt spid="5"/>
+                                        </p:tgtEl>
+                                        <p:attrNameLst>
+                                          <p:attrName>ppt_w</p:attrName>
+                                        </p:attrNameLst>
+                                      </p:cBhvr>
+                                      <p:tavLst>
+                                        <p:tav tm="0">
+                                          <p:val>
+                                            <p:strVal val="ppt_w"/>
+                                          </p:val>
+                                        </p:tav>
+                                        <p:tav tm="100000">
+                                          <p:val>
+                                            <p:fltVal val="0"/>
+                                          </p:val>
+                                        </p:tav>
+                                      </p:tavLst>
+                                    </p:anim>
+                                    <p:anim calcmode="lin" valueType="num">
+                                      <p:cBhvr>
+                                        <p:cTn id="19" dur="500"/>
+                                        <p:tgtEl>
+                                          <p:spTgt spid="5"/>
+                                        </p:tgtEl>
+                                        <p:attrNameLst>
+                                          <p:attrName>ppt_h</p:attrName>
+                                        </p:attrNameLst>
+                                      </p:cBhvr>
+                                      <p:tavLst>
+                                        <p:tav tm="0">
+                                          <p:val>
+                                            <p:strVal val="ppt_h"/>
+                                          </p:val>
+                                        </p:tav>
+                                        <p:tav tm="100000">
+                                          <p:val>
+                                            <p:fltVal val="0"/>
+                                          </p:val>
+                                        </p:tav>
+                                      </p:tavLst>
+                                    </p:anim>
+                                    <p:animEffect transition="out" filter="fade">
+                                      <p:cBhvr>
+                                        <p:cTn id="20" dur="500"/>
+                                        <p:tgtEl>
+                                          <p:spTgt spid="5"/>
+                                        </p:tgtEl>
+                                      </p:cBhvr>
+                                    </p:animEffect>
+                                    <p:set>
+                                      <p:cBhvr>
+                                        <p:cTn id="21" dur="1" fill="hold">
+                                          <p:stCondLst>
+                                            <p:cond delay="499"/>
+                                          </p:stCondLst>
+                                        </p:cTn>
+                                        <p:tgtEl>
+                                          <p:spTgt spid="5"/>
+                                        </p:tgtEl>
+                                        <p:attrNameLst>
+                                          <p:attrName>style.visibility</p:attrName>
+                                        </p:attrNameLst>
+                                      </p:cBhvr>
+                                      <p:to>
+                                        <p:strVal val="hidden"/>
+                                      </p:to>
+                                    </p:set>
+                                  </p:childTnLst>
+                                </p:cTn>
+                              </p:par>
+                              <p:par>
+                                <p:cTn id="22" presetID="53" presetClass="entr" presetSubtype="16" fill="hold" nodeType="withEffect">
+                                  <p:stCondLst>
+                                    <p:cond delay="0"/>
+                                  </p:stCondLst>
+                                  <p:childTnLst>
+                                    <p:set>
+                                      <p:cBhvr>
+                                        <p:cTn id="23" dur="1" fill="hold">
+                                          <p:stCondLst>
+                                            <p:cond delay="0"/>
+                                          </p:stCondLst>
+                                        </p:cTn>
+                                        <p:tgtEl>
+                                          <p:spTgt spid="7"/>
+                                        </p:tgtEl>
+                                        <p:attrNameLst>
+                                          <p:attrName>style.visibility</p:attrName>
+                                        </p:attrNameLst>
+                                      </p:cBhvr>
+                                      <p:to>
+                                        <p:strVal val="visible"/>
+                                      </p:to>
+                                    </p:set>
+                                    <p:anim calcmode="lin" valueType="num">
+                                      <p:cBhvr>
+                                        <p:cTn id="24" dur="500" fill="hold"/>
+                                        <p:tgtEl>
+                                          <p:spTgt spid="7"/>
+                                        </p:tgtEl>
+                                        <p:attrNameLst>
+                                          <p:attrName>ppt_w</p:attrName>
+                                        </p:attrNameLst>
+                                      </p:cBhvr>
+                                      <p:tavLst>
+                                        <p:tav tm="0">
+                                          <p:val>
+                                            <p:fltVal val="0"/>
+                                          </p:val>
+                                        </p:tav>
+                                        <p:tav tm="100000">
+                                          <p:val>
+                                            <p:strVal val="#ppt_w"/>
+                                          </p:val>
+                                        </p:tav>
+                                      </p:tavLst>
+                                    </p:anim>
+                                    <p:anim calcmode="lin" valueType="num">
+                                      <p:cBhvr>
+                                        <p:cTn id="25" dur="500" fill="hold"/>
+                                        <p:tgtEl>
+                                          <p:spTgt spid="7"/>
+                                        </p:tgtEl>
+                                        <p:attrNameLst>
+                                          <p:attrName>ppt_h</p:attrName>
+                                        </p:attrNameLst>
+                                      </p:cBhvr>
+                                      <p:tavLst>
+                                        <p:tav tm="0">
+                                          <p:val>
+                                            <p:fltVal val="0"/>
+                                          </p:val>
+                                        </p:tav>
+                                        <p:tav tm="100000">
+                                          <p:val>
+                                            <p:strVal val="#ppt_h"/>
+                                          </p:val>
+                                        </p:tav>
+                                      </p:tavLst>
+                                    </p:anim>
+                                    <p:animEffect transition="in" filter="fade">
+                                      <p:cBhvr>
+                                        <p:cTn id="26" dur="500"/>
+                                        <p:tgtEl>
+                                          <p:spTgt spid="7"/>
+                                        </p:tgtEl>
+                                      </p:cBhvr>
+                                    </p:animEffect>
+                                  </p:childTnLst>
+                                </p:cTn>
+                              </p:par>
+                              <p:par>
+                                <p:cTn id="27" presetID="10" presetClass="entr" presetSubtype="0" fill="hold" nodeType="withEffect">
+                                  <p:stCondLst>
+                                    <p:cond delay="0"/>
+                                  </p:stCondLst>
+                                  <p:childTnLst>
+                                    <p:set>
+                                      <p:cBhvr>
+                                        <p:cTn id="28" dur="1" fill="hold">
+                                          <p:stCondLst>
+                                            <p:cond delay="0"/>
+                                          </p:stCondLst>
+                                        </p:cTn>
+                                        <p:tgtEl>
+                                          <p:spTgt spid="6">
+                                            <p:txEl>
+                                              <p:pRg st="1" end="1"/>
+                                            </p:txEl>
+                                          </p:spTgt>
+                                        </p:tgtEl>
+                                        <p:attrNameLst>
+                                          <p:attrName>style.visibility</p:attrName>
+                                        </p:attrNameLst>
+                                      </p:cBhvr>
+                                      <p:to>
+                                        <p:strVal val="visible"/>
+                                      </p:to>
+                                    </p:set>
+                                    <p:animEffect transition="in" filter="fade">
+                                      <p:cBhvr>
+                                        <p:cTn id="29" dur="500"/>
+                                        <p:tgtEl>
+                                          <p:spTgt spid="6">
+                                            <p:txEl>
+                                              <p:pRg st="1" end="1"/>
+                                            </p:txEl>
+                                          </p:spTgt>
+                                        </p:tgtEl>
+                                      </p:cBhvr>
+                                    </p:animEffect>
+                                  </p:childTnLst>
+                                </p:cTn>
+                              </p:par>
+                            </p:childTnLst>
+                          </p:cTn>
+                        </p:par>
+                      </p:childTnLst>
+                    </p:cTn>
+                  </p:par>
+                  <p:par>
+                    <p:cTn id="30" fill="hold">
+                      <p:stCondLst>
+                        <p:cond delay="indefinite"/>
+                      </p:stCondLst>
+                      <p:childTnLst>
+                        <p:par>
+                          <p:cTn id="31" fill="hold">
+                            <p:stCondLst>
+                              <p:cond delay="0"/>
+                            </p:stCondLst>
+                            <p:childTnLst>
+                              <p:par>
+                                <p:cTn id="32" presetID="53" presetClass="exit" presetSubtype="32" fill="hold" nodeType="clickEffect">
+                                  <p:stCondLst>
+                                    <p:cond delay="0"/>
+                                  </p:stCondLst>
+                                  <p:childTnLst>
+                                    <p:anim calcmode="lin" valueType="num">
+                                      <p:cBhvr>
+                                        <p:cTn id="33" dur="500"/>
+                                        <p:tgtEl>
+                                          <p:spTgt spid="7"/>
+                                        </p:tgtEl>
+                                        <p:attrNameLst>
+                                          <p:attrName>ppt_w</p:attrName>
+                                        </p:attrNameLst>
+                                      </p:cBhvr>
+                                      <p:tavLst>
+                                        <p:tav tm="0">
+                                          <p:val>
+                                            <p:strVal val="ppt_w"/>
+                                          </p:val>
+                                        </p:tav>
+                                        <p:tav tm="100000">
+                                          <p:val>
+                                            <p:fltVal val="0"/>
+                                          </p:val>
+                                        </p:tav>
+                                      </p:tavLst>
+                                    </p:anim>
+                                    <p:anim calcmode="lin" valueType="num">
+                                      <p:cBhvr>
+                                        <p:cTn id="34" dur="500"/>
+                                        <p:tgtEl>
+                                          <p:spTgt spid="7"/>
+                                        </p:tgtEl>
+                                        <p:attrNameLst>
+                                          <p:attrName>ppt_h</p:attrName>
+                                        </p:attrNameLst>
+                                      </p:cBhvr>
+                                      <p:tavLst>
+                                        <p:tav tm="0">
+                                          <p:val>
+                                            <p:strVal val="ppt_h"/>
+                                          </p:val>
+                                        </p:tav>
+                                        <p:tav tm="100000">
+                                          <p:val>
+                                            <p:fltVal val="0"/>
+                                          </p:val>
+                                        </p:tav>
+                                      </p:tavLst>
+                                    </p:anim>
+                                    <p:animEffect transition="out" filter="fade">
+                                      <p:cBhvr>
+                                        <p:cTn id="35" dur="500"/>
+                                        <p:tgtEl>
+                                          <p:spTgt spid="7"/>
+                                        </p:tgtEl>
+                                      </p:cBhvr>
+                                    </p:animEffect>
+                                    <p:set>
+                                      <p:cBhvr>
+                                        <p:cTn id="36" dur="1" fill="hold">
+                                          <p:stCondLst>
+                                            <p:cond delay="499"/>
+                                          </p:stCondLst>
+                                        </p:cTn>
+                                        <p:tgtEl>
+                                          <p:spTgt spid="7"/>
+                                        </p:tgtEl>
+                                        <p:attrNameLst>
+                                          <p:attrName>style.visibility</p:attrName>
+                                        </p:attrNameLst>
+                                      </p:cBhvr>
+                                      <p:to>
+                                        <p:strVal val="hidden"/>
+                                      </p:to>
+                                    </p:set>
+                                  </p:childTnLst>
+                                </p:cTn>
+                              </p:par>
+                              <p:par>
+                                <p:cTn id="37" presetID="53" presetClass="entr" presetSubtype="16" fill="hold" nodeType="withEffect">
+                                  <p:stCondLst>
+                                    <p:cond delay="0"/>
+                                  </p:stCondLst>
+                                  <p:childTnLst>
+                                    <p:set>
+                                      <p:cBhvr>
+                                        <p:cTn id="38" dur="1" fill="hold">
+                                          <p:stCondLst>
+                                            <p:cond delay="0"/>
+                                          </p:stCondLst>
+                                        </p:cTn>
+                                        <p:tgtEl>
+                                          <p:spTgt spid="8"/>
+                                        </p:tgtEl>
+                                        <p:attrNameLst>
+                                          <p:attrName>style.visibility</p:attrName>
+                                        </p:attrNameLst>
+                                      </p:cBhvr>
+                                      <p:to>
+                                        <p:strVal val="visible"/>
+                                      </p:to>
+                                    </p:set>
+                                    <p:anim calcmode="lin" valueType="num">
+                                      <p:cBhvr>
+                                        <p:cTn id="39" dur="500" fill="hold"/>
+                                        <p:tgtEl>
+                                          <p:spTgt spid="8"/>
+                                        </p:tgtEl>
+                                        <p:attrNameLst>
+                                          <p:attrName>ppt_w</p:attrName>
+                                        </p:attrNameLst>
+                                      </p:cBhvr>
+                                      <p:tavLst>
+                                        <p:tav tm="0">
+                                          <p:val>
+                                            <p:fltVal val="0"/>
+                                          </p:val>
+                                        </p:tav>
+                                        <p:tav tm="100000">
+                                          <p:val>
+                                            <p:strVal val="#ppt_w"/>
+                                          </p:val>
+                                        </p:tav>
+                                      </p:tavLst>
+                                    </p:anim>
+                                    <p:anim calcmode="lin" valueType="num">
+                                      <p:cBhvr>
+                                        <p:cTn id="40" dur="500" fill="hold"/>
+                                        <p:tgtEl>
+                                          <p:spTgt spid="8"/>
+                                        </p:tgtEl>
+                                        <p:attrNameLst>
+                                          <p:attrName>ppt_h</p:attrName>
+                                        </p:attrNameLst>
+                                      </p:cBhvr>
+                                      <p:tavLst>
+                                        <p:tav tm="0">
+                                          <p:val>
+                                            <p:fltVal val="0"/>
+                                          </p:val>
+                                        </p:tav>
+                                        <p:tav tm="100000">
+                                          <p:val>
+                                            <p:strVal val="#ppt_h"/>
+                                          </p:val>
+                                        </p:tav>
+                                      </p:tavLst>
+                                    </p:anim>
+                                    <p:animEffect transition="in" filter="fade">
+                                      <p:cBhvr>
+                                        <p:cTn id="41" dur="500"/>
+                                        <p:tgtEl>
+                                          <p:spTgt spid="8"/>
+                                        </p:tgtEl>
+                                      </p:cBhvr>
+                                    </p:animEffect>
+                                  </p:childTnLst>
+                                </p:cTn>
+                              </p:par>
+                              <p:par>
+                                <p:cTn id="42" presetID="10" presetClass="entr" presetSubtype="0" fill="hold" nodeType="withEffect">
+                                  <p:stCondLst>
+                                    <p:cond delay="0"/>
+                                  </p:stCondLst>
+                                  <p:childTnLst>
+                                    <p:set>
+                                      <p:cBhvr>
+                                        <p:cTn id="43" dur="1" fill="hold">
+                                          <p:stCondLst>
+                                            <p:cond delay="0"/>
+                                          </p:stCondLst>
+                                        </p:cTn>
+                                        <p:tgtEl>
+                                          <p:spTgt spid="6">
+                                            <p:txEl>
+                                              <p:pRg st="2" end="2"/>
+                                            </p:txEl>
+                                          </p:spTgt>
+                                        </p:tgtEl>
+                                        <p:attrNameLst>
+                                          <p:attrName>style.visibility</p:attrName>
+                                        </p:attrNameLst>
+                                      </p:cBhvr>
+                                      <p:to>
+                                        <p:strVal val="visible"/>
+                                      </p:to>
+                                    </p:set>
+                                    <p:animEffect transition="in" filter="fade">
+                                      <p:cBhvr>
+                                        <p:cTn id="44" dur="500"/>
+                                        <p:tgtEl>
+                                          <p:spTgt spid="6">
+                                            <p:txEl>
+                                              <p:pRg st="2" end="2"/>
+                                            </p:txEl>
+                                          </p:spTgt>
+                                        </p:tgtEl>
+                                      </p:cBhvr>
+                                    </p:animEffect>
+                                  </p:childTnLst>
+                                </p:cTn>
+                              </p:par>
+                            </p:childTnLst>
+                          </p:cTn>
+                        </p:par>
+                      </p:childTnLst>
+                    </p:cTn>
+                  </p:par>
+                  <p:par>
+                    <p:cTn id="45" fill="hold">
+                      <p:stCondLst>
+                        <p:cond delay="indefinite"/>
+                      </p:stCondLst>
+                      <p:childTnLst>
+                        <p:par>
+                          <p:cTn id="46" fill="hold">
+                            <p:stCondLst>
+                              <p:cond delay="0"/>
+                            </p:stCondLst>
+                            <p:childTnLst>
+                              <p:par>
+                                <p:cTn id="47" presetID="10" presetClass="entr" presetSubtype="0" fill="hold" nodeType="clickEffect">
+                                  <p:stCondLst>
+                                    <p:cond delay="0"/>
+                                  </p:stCondLst>
+                                  <p:childTnLst>
+                                    <p:set>
+                                      <p:cBhvr>
+                                        <p:cTn id="48" dur="1" fill="hold">
+                                          <p:stCondLst>
+                                            <p:cond delay="0"/>
+                                          </p:stCondLst>
+                                        </p:cTn>
+                                        <p:tgtEl>
+                                          <p:spTgt spid="6">
+                                            <p:txEl>
+                                              <p:pRg st="3" end="3"/>
+                                            </p:txEl>
+                                          </p:spTgt>
+                                        </p:tgtEl>
+                                        <p:attrNameLst>
+                                          <p:attrName>style.visibility</p:attrName>
+                                        </p:attrNameLst>
+                                      </p:cBhvr>
+                                      <p:to>
+                                        <p:strVal val="visible"/>
+                                      </p:to>
+                                    </p:set>
+                                    <p:animEffect transition="in" filter="fade">
+                                      <p:cBhvr>
+                                        <p:cTn id="49" dur="500"/>
+                                        <p:tgtEl>
+                                          <p:spTgt spid="6">
+                                            <p:txEl>
+                                              <p:pRg st="3" end="3"/>
+                                            </p:txEl>
+                                          </p:spTgt>
+                                        </p:tgtEl>
+                                      </p:cBhvr>
+                                    </p:animEffect>
+                                  </p:childTnLst>
+                                </p:cTn>
+                              </p:par>
+                            </p:childTnLst>
+                          </p:cTn>
+                        </p:par>
+                      </p:childTnLst>
+                    </p:cTn>
+                  </p:par>
+                  <p:par>
+                    <p:cTn id="50" fill="hold">
+                      <p:stCondLst>
+                        <p:cond delay="indefinite"/>
+                      </p:stCondLst>
+                      <p:childTnLst>
+                        <p:par>
+                          <p:cTn id="51" fill="hold">
+                            <p:stCondLst>
+                              <p:cond delay="0"/>
+                            </p:stCondLst>
+                            <p:childTnLst>
+                              <p:par>
+                                <p:cTn id="52" presetID="10" presetClass="entr" presetSubtype="0" fill="hold" nodeType="clickEffect">
+                                  <p:stCondLst>
+                                    <p:cond delay="0"/>
+                                  </p:stCondLst>
+                                  <p:childTnLst>
+                                    <p:set>
+                                      <p:cBhvr>
+                                        <p:cTn id="53" dur="1" fill="hold">
+                                          <p:stCondLst>
+                                            <p:cond delay="0"/>
+                                          </p:stCondLst>
+                                        </p:cTn>
+                                        <p:tgtEl>
+                                          <p:spTgt spid="6">
+                                            <p:txEl>
+                                              <p:pRg st="4" end="4"/>
+                                            </p:txEl>
+                                          </p:spTgt>
+                                        </p:tgtEl>
+                                        <p:attrNameLst>
+                                          <p:attrName>style.visibility</p:attrName>
+                                        </p:attrNameLst>
+                                      </p:cBhvr>
+                                      <p:to>
+                                        <p:strVal val="visible"/>
+                                      </p:to>
+                                    </p:set>
+                                    <p:animEffect transition="in" filter="fade">
+                                      <p:cBhvr>
+                                        <p:cTn id="54" dur="500"/>
+                                        <p:tgtEl>
+                                          <p:spTgt spid="6">
+                                            <p:txEl>
+                                              <p:pRg st="4" end="4"/>
+                                            </p:txEl>
+                                          </p:spTgt>
+                                        </p:tgtEl>
+                                      </p:cBhvr>
+                                    </p:animEffect>
+                                  </p:childTnLst>
+                                </p:cTn>
+                              </p:par>
+                              <p:par>
+                                <p:cTn id="55" presetID="53" presetClass="exit" presetSubtype="32" fill="hold" nodeType="withEffect">
+                                  <p:stCondLst>
+                                    <p:cond delay="0"/>
+                                  </p:stCondLst>
+                                  <p:childTnLst>
+                                    <p:anim calcmode="lin" valueType="num">
+                                      <p:cBhvr>
+                                        <p:cTn id="56" dur="500"/>
+                                        <p:tgtEl>
+                                          <p:spTgt spid="8"/>
+                                        </p:tgtEl>
+                                        <p:attrNameLst>
+                                          <p:attrName>ppt_w</p:attrName>
+                                        </p:attrNameLst>
+                                      </p:cBhvr>
+                                      <p:tavLst>
+                                        <p:tav tm="0">
+                                          <p:val>
+                                            <p:strVal val="ppt_w"/>
+                                          </p:val>
+                                        </p:tav>
+                                        <p:tav tm="100000">
+                                          <p:val>
+                                            <p:fltVal val="0"/>
+                                          </p:val>
+                                        </p:tav>
+                                      </p:tavLst>
+                                    </p:anim>
+                                    <p:anim calcmode="lin" valueType="num">
+                                      <p:cBhvr>
+                                        <p:cTn id="57" dur="500"/>
+                                        <p:tgtEl>
+                                          <p:spTgt spid="8"/>
+                                        </p:tgtEl>
+                                        <p:attrNameLst>
+                                          <p:attrName>ppt_h</p:attrName>
+                                        </p:attrNameLst>
+                                      </p:cBhvr>
+                                      <p:tavLst>
+                                        <p:tav tm="0">
+                                          <p:val>
+                                            <p:strVal val="ppt_h"/>
+                                          </p:val>
+                                        </p:tav>
+                                        <p:tav tm="100000">
+                                          <p:val>
+                                            <p:fltVal val="0"/>
+                                          </p:val>
+                                        </p:tav>
+                                      </p:tavLst>
+                                    </p:anim>
+                                    <p:animEffect transition="out" filter="fade">
+                                      <p:cBhvr>
+                                        <p:cTn id="58" dur="500"/>
+                                        <p:tgtEl>
+                                          <p:spTgt spid="8"/>
+                                        </p:tgtEl>
+                                      </p:cBhvr>
+                                    </p:animEffect>
+                                    <p:set>
+                                      <p:cBhvr>
+                                        <p:cTn id="59" dur="1" fill="hold">
+                                          <p:stCondLst>
+                                            <p:cond delay="499"/>
+                                          </p:stCondLst>
+                                        </p:cTn>
+                                        <p:tgtEl>
+                                          <p:spTgt spid="8"/>
+                                        </p:tgtEl>
+                                        <p:attrNameLst>
+                                          <p:attrName>style.visibility</p:attrName>
+                                        </p:attrNameLst>
+                                      </p:cBhvr>
+                                      <p:to>
+                                        <p:strVal val="hidden"/>
+                                      </p:to>
+                                    </p:set>
+                                  </p:childTnLst>
+                                </p:cTn>
+                              </p:par>
+                              <p:par>
+                                <p:cTn id="60" presetID="53" presetClass="entr" presetSubtype="16" fill="hold" nodeType="withEffect">
+                                  <p:stCondLst>
+                                    <p:cond delay="0"/>
+                                  </p:stCondLst>
+                                  <p:childTnLst>
+                                    <p:set>
+                                      <p:cBhvr>
+                                        <p:cTn id="61" dur="1" fill="hold">
+                                          <p:stCondLst>
+                                            <p:cond delay="0"/>
+                                          </p:stCondLst>
+                                        </p:cTn>
+                                        <p:tgtEl>
+                                          <p:spTgt spid="9"/>
+                                        </p:tgtEl>
+                                        <p:attrNameLst>
+                                          <p:attrName>style.visibility</p:attrName>
+                                        </p:attrNameLst>
+                                      </p:cBhvr>
+                                      <p:to>
+                                        <p:strVal val="visible"/>
+                                      </p:to>
+                                    </p:set>
+                                    <p:anim calcmode="lin" valueType="num">
+                                      <p:cBhvr>
+                                        <p:cTn id="62" dur="500" fill="hold"/>
+                                        <p:tgtEl>
+                                          <p:spTgt spid="9"/>
+                                        </p:tgtEl>
+                                        <p:attrNameLst>
+                                          <p:attrName>ppt_w</p:attrName>
+                                        </p:attrNameLst>
+                                      </p:cBhvr>
+                                      <p:tavLst>
+                                        <p:tav tm="0">
+                                          <p:val>
+                                            <p:fltVal val="0"/>
+                                          </p:val>
+                                        </p:tav>
+                                        <p:tav tm="100000">
+                                          <p:val>
+                                            <p:strVal val="#ppt_w"/>
+                                          </p:val>
+                                        </p:tav>
+                                      </p:tavLst>
+                                    </p:anim>
+                                    <p:anim calcmode="lin" valueType="num">
+                                      <p:cBhvr>
+                                        <p:cTn id="63" dur="500" fill="hold"/>
+                                        <p:tgtEl>
+                                          <p:spTgt spid="9"/>
+                                        </p:tgtEl>
+                                        <p:attrNameLst>
+                                          <p:attrName>ppt_h</p:attrName>
+                                        </p:attrNameLst>
+                                      </p:cBhvr>
+                                      <p:tavLst>
+                                        <p:tav tm="0">
+                                          <p:val>
+                                            <p:fltVal val="0"/>
+                                          </p:val>
+                                        </p:tav>
+                                        <p:tav tm="100000">
+                                          <p:val>
+                                            <p:strVal val="#ppt_h"/>
+                                          </p:val>
+                                        </p:tav>
+                                      </p:tavLst>
+                                    </p:anim>
+                                    <p:animEffect transition="in" filter="fade">
+                                      <p:cBhvr>
+                                        <p:cTn id="64" dur="500"/>
+                                        <p:tgtEl>
+                                          <p:spTgt spid="9"/>
+                                        </p:tgtEl>
+                                      </p:cBhvr>
+                                    </p:animEffect>
+                                  </p:childTnLst>
+                                </p:cTn>
+                              </p:par>
+                            </p:childTnLst>
+                          </p:cTn>
+                        </p:par>
+                      </p:childTnLst>
+                    </p:cTn>
+                  </p:par>
+                </p:childTnLst>
+              </p:cTn>
+              <p:prevCondLst>
+                <p:cond evt="onPrev" delay="0">
+                  <p:tgtEl>
+                    <p:sldTgt/>
+                  </p:tgtEl>
+                </p:cond>
+              </p:prevCondLst>
+              <p:nextCondLst>
+                <p:cond evt="onNext" delay="0">
+                  <p:tgtEl>
+                    <p:sldTgt/>
+                  </p:tgtEl>
+                </p:cond>
+              </p:nextCondLst>
+            </p:seq>
+          </p:childTnLst>
+        </p:cTn>
+      </p:par>
+    </p:tnLst>
+  </p:timing>
+</p:sld>
+</file>
+
 <file path=ppt/slides/slide2.xml><?xml version="1.0" encoding="utf-8"?>
 <p:sld xmlns:a="http://schemas.openxmlformats.org/drawingml/2006/main" xmlns:r="http://schemas.openxmlformats.org/officeDocument/2006/relationships" xmlns:p="http://schemas.openxmlformats.org/presentationml/2006/main">
   <p:cSld>
@@ -4370,32 +5576,139 @@
             <p:ph idx="1"/>
           </p:nvPr>
         </p:nvSpPr>
-        <p:spPr/>
+        <p:spPr>
+          <a:xfrm>
+            <a:off x="766354" y="1798551"/>
+            <a:ext cx="7886700" cy="934992"/>
+          </a:xfrm>
+        </p:spPr>
         <p:txBody>
           <a:bodyPr/>
           <a:lstStyle/>
           <a:p>
-            <a:r>
-              <a:rPr lang="it-IT" dirty="0" err="1" smtClean="0"/>
-              <a:t>Let’s</a:t>
-            </a:r>
-            <a:r>
-              <a:rPr lang="it-IT" dirty="0" smtClean="0"/>
-              <a:t> </a:t>
-            </a:r>
-            <a:r>
-              <a:rPr lang="it-IT" dirty="0" err="1" smtClean="0"/>
-              <a:t>see</a:t>
-            </a:r>
-            <a:r>
-              <a:rPr lang="it-IT" dirty="0" smtClean="0"/>
-              <a:t> a </a:t>
-            </a:r>
-            <a:r>
-              <a:rPr lang="it-IT" dirty="0" err="1" smtClean="0"/>
-              <a:t>possible</a:t>
-            </a:r>
-            <a:endParaRPr lang="it-IT" dirty="0"/>
+            <a:pPr marL="0" indent="0">
+              <a:buNone/>
+            </a:pPr>
+            <a:r>
+              <a:rPr lang="en-US" dirty="0" smtClean="0">
+                <a:latin typeface="Georgia" panose="02040502050405020303" pitchFamily="18" charset="0"/>
+              </a:rPr>
+              <a:t>Let’s see a possible scenario of use of MTS’s application with some explicative mockups.</a:t>
+            </a:r>
+            <a:endParaRPr lang="en-US" dirty="0">
+              <a:latin typeface="Georgia" panose="02040502050405020303" pitchFamily="18" charset="0"/>
+            </a:endParaRPr>
+          </a:p>
+        </p:txBody>
+      </p:sp>
+      <p:sp>
+        <p:nvSpPr>
+          <p:cNvPr id="4" name="CasellaDiTesto 3"/>
+          <p:cNvSpPr txBox="1"/>
+          <p:nvPr/>
+        </p:nvSpPr>
+        <p:spPr>
+          <a:xfrm>
+            <a:off x="766354" y="3056708"/>
+            <a:ext cx="7437120" cy="2308324"/>
+          </a:xfrm>
+          <a:prstGeom prst="rect">
+            <a:avLst/>
+          </a:prstGeom>
+          <a:noFill/>
+        </p:spPr>
+        <p:txBody>
+          <a:bodyPr wrap="square" rtlCol="0">
+            <a:spAutoFit/>
+          </a:bodyPr>
+          <a:lstStyle/>
+          <a:p>
+            <a:r>
+              <a:rPr lang="en-US" dirty="0" smtClean="0">
+                <a:latin typeface="Georgia" panose="02040502050405020303" pitchFamily="18" charset="0"/>
+              </a:rPr>
+              <a:t>Suppose that the student Luca Bianchi has to go to </a:t>
+            </a:r>
+            <a:r>
+              <a:rPr lang="en-US" dirty="0" err="1" smtClean="0">
+                <a:latin typeface="Georgia" panose="02040502050405020303" pitchFamily="18" charset="0"/>
+              </a:rPr>
+              <a:t>Politecnico</a:t>
+            </a:r>
+            <a:r>
+              <a:rPr lang="en-US" dirty="0" smtClean="0">
+                <a:latin typeface="Georgia" panose="02040502050405020303" pitchFamily="18" charset="0"/>
+              </a:rPr>
+              <a:t> di Milano to have an exam.</a:t>
+            </a:r>
+          </a:p>
+          <a:p>
+            <a:r>
+              <a:rPr lang="en-US" dirty="0" smtClean="0">
+                <a:latin typeface="Georgia" panose="02040502050405020303" pitchFamily="18" charset="0"/>
+              </a:rPr>
+              <a:t>Unfortunately, TRENORD has other plans: in fact, a strike is arranged exactly the day of Luca’s exam.</a:t>
+            </a:r>
+          </a:p>
+          <a:p>
+            <a:r>
+              <a:rPr lang="en-US" dirty="0" smtClean="0">
+                <a:latin typeface="Georgia" panose="02040502050405020303" pitchFamily="18" charset="0"/>
+              </a:rPr>
+              <a:t>Knowing that, Luca cautiously decide to reserve himself a taxi using an application his friends have been talking about: </a:t>
+            </a:r>
+            <a:r>
+              <a:rPr lang="en-US" dirty="0" err="1" smtClean="0">
+                <a:latin typeface="Georgia" panose="02040502050405020303" pitchFamily="18" charset="0"/>
+              </a:rPr>
+              <a:t>MyTaxiService</a:t>
+            </a:r>
+            <a:r>
+              <a:rPr lang="en-US" dirty="0" smtClean="0">
+                <a:latin typeface="Georgia" panose="02040502050405020303" pitchFamily="18" charset="0"/>
+              </a:rPr>
+              <a:t>.</a:t>
+            </a:r>
+          </a:p>
+          <a:p>
+            <a:r>
+              <a:rPr lang="en-US" dirty="0" smtClean="0">
+                <a:latin typeface="Georgia" panose="02040502050405020303" pitchFamily="18" charset="0"/>
+              </a:rPr>
+              <a:t>He turn on his laptop and after a quick google search he finds MTS’s website.</a:t>
+            </a:r>
+          </a:p>
+        </p:txBody>
+      </p:sp>
+      <p:sp>
+        <p:nvSpPr>
+          <p:cNvPr id="6" name="CasellaDiTesto 5"/>
+          <p:cNvSpPr txBox="1"/>
+          <p:nvPr/>
+        </p:nvSpPr>
+        <p:spPr>
+          <a:xfrm>
+            <a:off x="766354" y="4349370"/>
+            <a:ext cx="7877991" cy="369332"/>
+          </a:xfrm>
+          <a:prstGeom prst="rect">
+            <a:avLst/>
+          </a:prstGeom>
+          <a:noFill/>
+        </p:spPr>
+        <p:txBody>
+          <a:bodyPr wrap="square" rtlCol="0">
+            <a:spAutoFit/>
+          </a:bodyPr>
+          <a:lstStyle/>
+          <a:p>
+            <a:r>
+              <a:rPr lang="en-US" dirty="0" smtClean="0"/>
+              <a:t>.</a:t>
+            </a:r>
+            <a:endParaRPr lang="en-US" dirty="0">
+              <a:latin typeface="Georgia" panose="02040502050405020303" pitchFamily="18" charset="0"/>
+            </a:endParaRPr>
           </a:p>
         </p:txBody>
       </p:sp>
@@ -4412,9 +5725,2049 @@
   <p:timing>
     <p:tnLst>
       <p:par>
-        <p:cTn id="1" dur="indefinite" restart="never" nodeType="tmRoot"/>
+        <p:cTn id="1" dur="indefinite" restart="never" nodeType="tmRoot">
+          <p:childTnLst>
+            <p:seq concurrent="1" nextAc="seek">
+              <p:cTn id="2" dur="indefinite" nodeType="mainSeq">
+                <p:childTnLst>
+                  <p:par>
+                    <p:cTn id="3" fill="hold">
+                      <p:stCondLst>
+                        <p:cond delay="indefinite"/>
+                      </p:stCondLst>
+                      <p:childTnLst>
+                        <p:par>
+                          <p:cTn id="4" fill="hold">
+                            <p:stCondLst>
+                              <p:cond delay="0"/>
+                            </p:stCondLst>
+                            <p:childTnLst>
+                              <p:par>
+                                <p:cTn id="5" presetID="10" presetClass="entr" presetSubtype="0" fill="hold" nodeType="clickEffect">
+                                  <p:stCondLst>
+                                    <p:cond delay="0"/>
+                                  </p:stCondLst>
+                                  <p:childTnLst>
+                                    <p:set>
+                                      <p:cBhvr>
+                                        <p:cTn id="6" dur="1" fill="hold">
+                                          <p:stCondLst>
+                                            <p:cond delay="0"/>
+                                          </p:stCondLst>
+                                        </p:cTn>
+                                        <p:tgtEl>
+                                          <p:spTgt spid="3">
+                                            <p:txEl>
+                                              <p:pRg st="0" end="0"/>
+                                            </p:txEl>
+                                          </p:spTgt>
+                                        </p:tgtEl>
+                                        <p:attrNameLst>
+                                          <p:attrName>style.visibility</p:attrName>
+                                        </p:attrNameLst>
+                                      </p:cBhvr>
+                                      <p:to>
+                                        <p:strVal val="visible"/>
+                                      </p:to>
+                                    </p:set>
+                                    <p:animEffect transition="in" filter="fade">
+                                      <p:cBhvr>
+                                        <p:cTn id="7" dur="500"/>
+                                        <p:tgtEl>
+                                          <p:spTgt spid="3">
+                                            <p:txEl>
+                                              <p:pRg st="0" end="0"/>
+                                            </p:txEl>
+                                          </p:spTgt>
+                                        </p:tgtEl>
+                                      </p:cBhvr>
+                                    </p:animEffect>
+                                  </p:childTnLst>
+                                </p:cTn>
+                              </p:par>
+                            </p:childTnLst>
+                          </p:cTn>
+                        </p:par>
+                      </p:childTnLst>
+                    </p:cTn>
+                  </p:par>
+                  <p:par>
+                    <p:cTn id="8" fill="hold">
+                      <p:stCondLst>
+                        <p:cond delay="indefinite"/>
+                      </p:stCondLst>
+                      <p:childTnLst>
+                        <p:par>
+                          <p:cTn id="9" fill="hold">
+                            <p:stCondLst>
+                              <p:cond delay="0"/>
+                            </p:stCondLst>
+                            <p:childTnLst>
+                              <p:par>
+                                <p:cTn id="10" presetID="10" presetClass="entr" presetSubtype="0" fill="hold" nodeType="clickEffect">
+                                  <p:stCondLst>
+                                    <p:cond delay="0"/>
+                                  </p:stCondLst>
+                                  <p:childTnLst>
+                                    <p:set>
+                                      <p:cBhvr>
+                                        <p:cTn id="11" dur="1" fill="hold">
+                                          <p:stCondLst>
+                                            <p:cond delay="0"/>
+                                          </p:stCondLst>
+                                        </p:cTn>
+                                        <p:tgtEl>
+                                          <p:spTgt spid="4">
+                                            <p:txEl>
+                                              <p:pRg st="0" end="0"/>
+                                            </p:txEl>
+                                          </p:spTgt>
+                                        </p:tgtEl>
+                                        <p:attrNameLst>
+                                          <p:attrName>style.visibility</p:attrName>
+                                        </p:attrNameLst>
+                                      </p:cBhvr>
+                                      <p:to>
+                                        <p:strVal val="visible"/>
+                                      </p:to>
+                                    </p:set>
+                                    <p:animEffect transition="in" filter="fade">
+                                      <p:cBhvr>
+                                        <p:cTn id="12" dur="500"/>
+                                        <p:tgtEl>
+                                          <p:spTgt spid="4">
+                                            <p:txEl>
+                                              <p:pRg st="0" end="0"/>
+                                            </p:txEl>
+                                          </p:spTgt>
+                                        </p:tgtEl>
+                                      </p:cBhvr>
+                                    </p:animEffect>
+                                  </p:childTnLst>
+                                </p:cTn>
+                              </p:par>
+                            </p:childTnLst>
+                          </p:cTn>
+                        </p:par>
+                      </p:childTnLst>
+                    </p:cTn>
+                  </p:par>
+                  <p:par>
+                    <p:cTn id="13" fill="hold">
+                      <p:stCondLst>
+                        <p:cond delay="indefinite"/>
+                      </p:stCondLst>
+                      <p:childTnLst>
+                        <p:par>
+                          <p:cTn id="14" fill="hold">
+                            <p:stCondLst>
+                              <p:cond delay="0"/>
+                            </p:stCondLst>
+                            <p:childTnLst>
+                              <p:par>
+                                <p:cTn id="15" presetID="10" presetClass="entr" presetSubtype="0" fill="hold" nodeType="clickEffect">
+                                  <p:stCondLst>
+                                    <p:cond delay="0"/>
+                                  </p:stCondLst>
+                                  <p:childTnLst>
+                                    <p:set>
+                                      <p:cBhvr>
+                                        <p:cTn id="16" dur="1" fill="hold">
+                                          <p:stCondLst>
+                                            <p:cond delay="0"/>
+                                          </p:stCondLst>
+                                        </p:cTn>
+                                        <p:tgtEl>
+                                          <p:spTgt spid="4">
+                                            <p:txEl>
+                                              <p:pRg st="1" end="1"/>
+                                            </p:txEl>
+                                          </p:spTgt>
+                                        </p:tgtEl>
+                                        <p:attrNameLst>
+                                          <p:attrName>style.visibility</p:attrName>
+                                        </p:attrNameLst>
+                                      </p:cBhvr>
+                                      <p:to>
+                                        <p:strVal val="visible"/>
+                                      </p:to>
+                                    </p:set>
+                                    <p:animEffect transition="in" filter="fade">
+                                      <p:cBhvr>
+                                        <p:cTn id="17" dur="500"/>
+                                        <p:tgtEl>
+                                          <p:spTgt spid="4">
+                                            <p:txEl>
+                                              <p:pRg st="1" end="1"/>
+                                            </p:txEl>
+                                          </p:spTgt>
+                                        </p:tgtEl>
+                                      </p:cBhvr>
+                                    </p:animEffect>
+                                  </p:childTnLst>
+                                </p:cTn>
+                              </p:par>
+                            </p:childTnLst>
+                          </p:cTn>
+                        </p:par>
+                      </p:childTnLst>
+                    </p:cTn>
+                  </p:par>
+                  <p:par>
+                    <p:cTn id="18" fill="hold">
+                      <p:stCondLst>
+                        <p:cond delay="indefinite"/>
+                      </p:stCondLst>
+                      <p:childTnLst>
+                        <p:par>
+                          <p:cTn id="19" fill="hold">
+                            <p:stCondLst>
+                              <p:cond delay="0"/>
+                            </p:stCondLst>
+                            <p:childTnLst>
+                              <p:par>
+                                <p:cTn id="20" presetID="10" presetClass="entr" presetSubtype="0" fill="hold" nodeType="clickEffect">
+                                  <p:stCondLst>
+                                    <p:cond delay="0"/>
+                                  </p:stCondLst>
+                                  <p:childTnLst>
+                                    <p:set>
+                                      <p:cBhvr>
+                                        <p:cTn id="21" dur="1" fill="hold">
+                                          <p:stCondLst>
+                                            <p:cond delay="0"/>
+                                          </p:stCondLst>
+                                        </p:cTn>
+                                        <p:tgtEl>
+                                          <p:spTgt spid="4">
+                                            <p:txEl>
+                                              <p:pRg st="2" end="2"/>
+                                            </p:txEl>
+                                          </p:spTgt>
+                                        </p:tgtEl>
+                                        <p:attrNameLst>
+                                          <p:attrName>style.visibility</p:attrName>
+                                        </p:attrNameLst>
+                                      </p:cBhvr>
+                                      <p:to>
+                                        <p:strVal val="visible"/>
+                                      </p:to>
+                                    </p:set>
+                                    <p:animEffect transition="in" filter="fade">
+                                      <p:cBhvr>
+                                        <p:cTn id="22" dur="500"/>
+                                        <p:tgtEl>
+                                          <p:spTgt spid="4">
+                                            <p:txEl>
+                                              <p:pRg st="2" end="2"/>
+                                            </p:txEl>
+                                          </p:spTgt>
+                                        </p:tgtEl>
+                                      </p:cBhvr>
+                                    </p:animEffect>
+                                  </p:childTnLst>
+                                </p:cTn>
+                              </p:par>
+                            </p:childTnLst>
+                          </p:cTn>
+                        </p:par>
+                      </p:childTnLst>
+                    </p:cTn>
+                  </p:par>
+                  <p:par>
+                    <p:cTn id="23" fill="hold">
+                      <p:stCondLst>
+                        <p:cond delay="indefinite"/>
+                      </p:stCondLst>
+                      <p:childTnLst>
+                        <p:par>
+                          <p:cTn id="24" fill="hold">
+                            <p:stCondLst>
+                              <p:cond delay="0"/>
+                            </p:stCondLst>
+                            <p:childTnLst>
+                              <p:par>
+                                <p:cTn id="25" presetID="10" presetClass="entr" presetSubtype="0" fill="hold" nodeType="clickEffect">
+                                  <p:stCondLst>
+                                    <p:cond delay="0"/>
+                                  </p:stCondLst>
+                                  <p:childTnLst>
+                                    <p:set>
+                                      <p:cBhvr>
+                                        <p:cTn id="26" dur="1" fill="hold">
+                                          <p:stCondLst>
+                                            <p:cond delay="0"/>
+                                          </p:stCondLst>
+                                        </p:cTn>
+                                        <p:tgtEl>
+                                          <p:spTgt spid="4">
+                                            <p:txEl>
+                                              <p:pRg st="3" end="3"/>
+                                            </p:txEl>
+                                          </p:spTgt>
+                                        </p:tgtEl>
+                                        <p:attrNameLst>
+                                          <p:attrName>style.visibility</p:attrName>
+                                        </p:attrNameLst>
+                                      </p:cBhvr>
+                                      <p:to>
+                                        <p:strVal val="visible"/>
+                                      </p:to>
+                                    </p:set>
+                                    <p:animEffect transition="in" filter="fade">
+                                      <p:cBhvr>
+                                        <p:cTn id="27" dur="500"/>
+                                        <p:tgtEl>
+                                          <p:spTgt spid="4">
+                                            <p:txEl>
+                                              <p:pRg st="3" end="3"/>
+                                            </p:txEl>
+                                          </p:spTgt>
+                                        </p:tgtEl>
+                                      </p:cBhvr>
+                                    </p:animEffect>
+                                  </p:childTnLst>
+                                </p:cTn>
+                              </p:par>
+                            </p:childTnLst>
+                          </p:cTn>
+                        </p:par>
+                      </p:childTnLst>
+                    </p:cTn>
+                  </p:par>
+                </p:childTnLst>
+              </p:cTn>
+              <p:prevCondLst>
+                <p:cond evt="onPrev" delay="0">
+                  <p:tgtEl>
+                    <p:sldTgt/>
+                  </p:tgtEl>
+                </p:cond>
+              </p:prevCondLst>
+              <p:nextCondLst>
+                <p:cond evt="onNext" delay="0">
+                  <p:tgtEl>
+                    <p:sldTgt/>
+                  </p:tgtEl>
+                </p:cond>
+              </p:nextCondLst>
+            </p:seq>
+          </p:childTnLst>
+        </p:cTn>
       </p:par>
     </p:tnLst>
+  </p:timing>
+</p:sld>
+</file>
+
+<file path=ppt/slides/slide5.xml><?xml version="1.0" encoding="utf-8"?>
+<p:sld xmlns:a="http://schemas.openxmlformats.org/drawingml/2006/main" xmlns:r="http://schemas.openxmlformats.org/officeDocument/2006/relationships" xmlns:p="http://schemas.openxmlformats.org/presentationml/2006/main">
+  <p:cSld>
+    <p:spTree>
+      <p:nvGrpSpPr>
+        <p:cNvPr id="1" name=""/>
+        <p:cNvGrpSpPr/>
+        <p:nvPr/>
+      </p:nvGrpSpPr>
+      <p:grpSpPr>
+        <a:xfrm>
+          <a:off x="0" y="0"/>
+          <a:ext cx="0" cy="0"/>
+          <a:chOff x="0" y="0"/>
+          <a:chExt cx="0" cy="0"/>
+        </a:xfrm>
+      </p:grpSpPr>
+      <p:pic>
+        <p:nvPicPr>
+          <p:cNvPr id="6" name="Segnaposto contenuto 5" descr="C:\Users\Alessandro\Desktop\Ale\GitHubSynch\myTaxyService-SE2-PozziRomani\OtherStuff\Mockups\WebHome.png"/>
+          <p:cNvPicPr>
+            <a:picLocks noGrp="1"/>
+          </p:cNvPicPr>
+          <p:nvPr>
+            <p:ph idx="1"/>
+          </p:nvPr>
+        </p:nvPicPr>
+        <p:blipFill>
+          <a:blip r:embed="rId2">
+            <a:extLst>
+              <a:ext uri="{28A0092B-C50C-407E-A947-70E740481C1C}">
+                <a14:useLocalDpi xmlns:a14="http://schemas.microsoft.com/office/drawing/2010/main" val="0"/>
+              </a:ext>
+            </a:extLst>
+          </a:blip>
+          <a:srcRect/>
+          <a:stretch>
+            <a:fillRect/>
+          </a:stretch>
+        </p:blipFill>
+        <p:spPr bwMode="auto">
+          <a:xfrm>
+            <a:off x="1359994" y="1224733"/>
+            <a:ext cx="6207755" cy="3861073"/>
+          </a:xfrm>
+          <a:prstGeom prst="rect">
+            <a:avLst/>
+          </a:prstGeom>
+          <a:noFill/>
+          <a:ln>
+            <a:noFill/>
+          </a:ln>
+        </p:spPr>
+      </p:pic>
+      <p:sp>
+        <p:nvSpPr>
+          <p:cNvPr id="8" name="CasellaDiTesto 7"/>
+          <p:cNvSpPr txBox="1"/>
+          <p:nvPr/>
+        </p:nvSpPr>
+        <p:spPr>
+          <a:xfrm>
+            <a:off x="1588725" y="748937"/>
+            <a:ext cx="5750292" cy="369332"/>
+          </a:xfrm>
+          <a:prstGeom prst="rect">
+            <a:avLst/>
+          </a:prstGeom>
+          <a:noFill/>
+        </p:spPr>
+        <p:txBody>
+          <a:bodyPr wrap="none" rtlCol="0">
+            <a:spAutoFit/>
+          </a:bodyPr>
+          <a:lstStyle/>
+          <a:p>
+            <a:r>
+              <a:rPr lang="en-US" dirty="0" smtClean="0">
+                <a:latin typeface="Georgia" panose="02040502050405020303" pitchFamily="18" charset="0"/>
+              </a:rPr>
+              <a:t>This is how the home of the web application looks like:</a:t>
+            </a:r>
+            <a:endParaRPr lang="en-US" dirty="0">
+              <a:latin typeface="Georgia" panose="02040502050405020303" pitchFamily="18" charset="0"/>
+            </a:endParaRPr>
+          </a:p>
+        </p:txBody>
+      </p:sp>
+      <p:sp>
+        <p:nvSpPr>
+          <p:cNvPr id="9" name="CasellaDiTesto 8"/>
+          <p:cNvSpPr txBox="1"/>
+          <p:nvPr/>
+        </p:nvSpPr>
+        <p:spPr>
+          <a:xfrm>
+            <a:off x="1088571" y="5192270"/>
+            <a:ext cx="7367452" cy="1200329"/>
+          </a:xfrm>
+          <a:prstGeom prst="rect">
+            <a:avLst/>
+          </a:prstGeom>
+          <a:noFill/>
+        </p:spPr>
+        <p:txBody>
+          <a:bodyPr wrap="square" rtlCol="0">
+            <a:spAutoFit/>
+          </a:bodyPr>
+          <a:lstStyle/>
+          <a:p>
+            <a:r>
+              <a:rPr lang="en-US" dirty="0" smtClean="0">
+                <a:latin typeface="Georgia" panose="02040502050405020303" pitchFamily="18" charset="0"/>
+              </a:rPr>
+              <a:t>Luca has never used </a:t>
+            </a:r>
+            <a:r>
+              <a:rPr lang="en-US" dirty="0" err="1" smtClean="0">
+                <a:latin typeface="Georgia" panose="02040502050405020303" pitchFamily="18" charset="0"/>
+              </a:rPr>
+              <a:t>MyTaxiService</a:t>
+            </a:r>
+            <a:r>
+              <a:rPr lang="en-US" dirty="0" smtClean="0">
+                <a:latin typeface="Georgia" panose="02040502050405020303" pitchFamily="18" charset="0"/>
+              </a:rPr>
+              <a:t> before, so he doesn’t have an account.</a:t>
+            </a:r>
+          </a:p>
+          <a:p>
+            <a:r>
+              <a:rPr lang="en-US" dirty="0" smtClean="0">
+                <a:latin typeface="Georgia" panose="02040502050405020303" pitchFamily="18" charset="0"/>
+              </a:rPr>
+              <a:t>Since an account is required to access MTS’s services, he clicks on the “Register now” button.</a:t>
+            </a:r>
+            <a:endParaRPr lang="en-US" dirty="0">
+              <a:latin typeface="Georgia" panose="02040502050405020303" pitchFamily="18" charset="0"/>
+            </a:endParaRPr>
+          </a:p>
+        </p:txBody>
+      </p:sp>
+    </p:spTree>
+    <p:extLst>
+      <p:ext uri="{BB962C8B-B14F-4D97-AF65-F5344CB8AC3E}">
+        <p14:creationId xmlns:p14="http://schemas.microsoft.com/office/powerpoint/2010/main" val="1201070404"/>
+      </p:ext>
+    </p:extLst>
+  </p:cSld>
+  <p:clrMapOvr>
+    <a:masterClrMapping/>
+  </p:clrMapOvr>
+  <p:timing>
+    <p:tnLst>
+      <p:par>
+        <p:cTn id="1" dur="indefinite" restart="never" nodeType="tmRoot">
+          <p:childTnLst>
+            <p:seq concurrent="1" nextAc="seek">
+              <p:cTn id="2" dur="indefinite" nodeType="mainSeq">
+                <p:childTnLst>
+                  <p:par>
+                    <p:cTn id="3" fill="hold">
+                      <p:stCondLst>
+                        <p:cond delay="indefinite"/>
+                        <p:cond evt="onBegin" delay="0">
+                          <p:tn val="2"/>
+                        </p:cond>
+                      </p:stCondLst>
+                      <p:childTnLst>
+                        <p:par>
+                          <p:cTn id="4" fill="hold">
+                            <p:stCondLst>
+                              <p:cond delay="0"/>
+                            </p:stCondLst>
+                            <p:childTnLst>
+                              <p:par>
+                                <p:cTn id="5" presetID="10" presetClass="entr" presetSubtype="0" fill="hold" grpId="0" nodeType="withEffect">
+                                  <p:stCondLst>
+                                    <p:cond delay="0"/>
+                                  </p:stCondLst>
+                                  <p:childTnLst>
+                                    <p:set>
+                                      <p:cBhvr>
+                                        <p:cTn id="6" dur="1" fill="hold">
+                                          <p:stCondLst>
+                                            <p:cond delay="0"/>
+                                          </p:stCondLst>
+                                        </p:cTn>
+                                        <p:tgtEl>
+                                          <p:spTgt spid="8"/>
+                                        </p:tgtEl>
+                                        <p:attrNameLst>
+                                          <p:attrName>style.visibility</p:attrName>
+                                        </p:attrNameLst>
+                                      </p:cBhvr>
+                                      <p:to>
+                                        <p:strVal val="visible"/>
+                                      </p:to>
+                                    </p:set>
+                                    <p:animEffect transition="in" filter="fade">
+                                      <p:cBhvr>
+                                        <p:cTn id="7" dur="500"/>
+                                        <p:tgtEl>
+                                          <p:spTgt spid="8"/>
+                                        </p:tgtEl>
+                                      </p:cBhvr>
+                                    </p:animEffect>
+                                  </p:childTnLst>
+                                </p:cTn>
+                              </p:par>
+                            </p:childTnLst>
+                          </p:cTn>
+                        </p:par>
+                      </p:childTnLst>
+                    </p:cTn>
+                  </p:par>
+                  <p:par>
+                    <p:cTn id="8" fill="hold">
+                      <p:stCondLst>
+                        <p:cond delay="indefinite"/>
+                      </p:stCondLst>
+                      <p:childTnLst>
+                        <p:par>
+                          <p:cTn id="9" fill="hold">
+                            <p:stCondLst>
+                              <p:cond delay="0"/>
+                            </p:stCondLst>
+                            <p:childTnLst>
+                              <p:par>
+                                <p:cTn id="10" presetID="53" presetClass="entr" presetSubtype="16" fill="hold" nodeType="clickEffect">
+                                  <p:stCondLst>
+                                    <p:cond delay="0"/>
+                                  </p:stCondLst>
+                                  <p:childTnLst>
+                                    <p:set>
+                                      <p:cBhvr>
+                                        <p:cTn id="11" dur="1" fill="hold">
+                                          <p:stCondLst>
+                                            <p:cond delay="0"/>
+                                          </p:stCondLst>
+                                        </p:cTn>
+                                        <p:tgtEl>
+                                          <p:spTgt spid="6"/>
+                                        </p:tgtEl>
+                                        <p:attrNameLst>
+                                          <p:attrName>style.visibility</p:attrName>
+                                        </p:attrNameLst>
+                                      </p:cBhvr>
+                                      <p:to>
+                                        <p:strVal val="visible"/>
+                                      </p:to>
+                                    </p:set>
+                                    <p:anim calcmode="lin" valueType="num">
+                                      <p:cBhvr>
+                                        <p:cTn id="12" dur="500" fill="hold"/>
+                                        <p:tgtEl>
+                                          <p:spTgt spid="6"/>
+                                        </p:tgtEl>
+                                        <p:attrNameLst>
+                                          <p:attrName>ppt_w</p:attrName>
+                                        </p:attrNameLst>
+                                      </p:cBhvr>
+                                      <p:tavLst>
+                                        <p:tav tm="0">
+                                          <p:val>
+                                            <p:fltVal val="0"/>
+                                          </p:val>
+                                        </p:tav>
+                                        <p:tav tm="100000">
+                                          <p:val>
+                                            <p:strVal val="#ppt_w"/>
+                                          </p:val>
+                                        </p:tav>
+                                      </p:tavLst>
+                                    </p:anim>
+                                    <p:anim calcmode="lin" valueType="num">
+                                      <p:cBhvr>
+                                        <p:cTn id="13" dur="500" fill="hold"/>
+                                        <p:tgtEl>
+                                          <p:spTgt spid="6"/>
+                                        </p:tgtEl>
+                                        <p:attrNameLst>
+                                          <p:attrName>ppt_h</p:attrName>
+                                        </p:attrNameLst>
+                                      </p:cBhvr>
+                                      <p:tavLst>
+                                        <p:tav tm="0">
+                                          <p:val>
+                                            <p:fltVal val="0"/>
+                                          </p:val>
+                                        </p:tav>
+                                        <p:tav tm="100000">
+                                          <p:val>
+                                            <p:strVal val="#ppt_h"/>
+                                          </p:val>
+                                        </p:tav>
+                                      </p:tavLst>
+                                    </p:anim>
+                                    <p:animEffect transition="in" filter="fade">
+                                      <p:cBhvr>
+                                        <p:cTn id="14" dur="500"/>
+                                        <p:tgtEl>
+                                          <p:spTgt spid="6"/>
+                                        </p:tgtEl>
+                                      </p:cBhvr>
+                                    </p:animEffect>
+                                  </p:childTnLst>
+                                </p:cTn>
+                              </p:par>
+                            </p:childTnLst>
+                          </p:cTn>
+                        </p:par>
+                      </p:childTnLst>
+                    </p:cTn>
+                  </p:par>
+                  <p:par>
+                    <p:cTn id="15" fill="hold">
+                      <p:stCondLst>
+                        <p:cond delay="indefinite"/>
+                      </p:stCondLst>
+                      <p:childTnLst>
+                        <p:par>
+                          <p:cTn id="16" fill="hold">
+                            <p:stCondLst>
+                              <p:cond delay="0"/>
+                            </p:stCondLst>
+                            <p:childTnLst>
+                              <p:par>
+                                <p:cTn id="17" presetID="10" presetClass="entr" presetSubtype="0" fill="hold" nodeType="clickEffect">
+                                  <p:stCondLst>
+                                    <p:cond delay="0"/>
+                                  </p:stCondLst>
+                                  <p:childTnLst>
+                                    <p:set>
+                                      <p:cBhvr>
+                                        <p:cTn id="18" dur="1" fill="hold">
+                                          <p:stCondLst>
+                                            <p:cond delay="0"/>
+                                          </p:stCondLst>
+                                        </p:cTn>
+                                        <p:tgtEl>
+                                          <p:spTgt spid="9">
+                                            <p:txEl>
+                                              <p:pRg st="0" end="0"/>
+                                            </p:txEl>
+                                          </p:spTgt>
+                                        </p:tgtEl>
+                                        <p:attrNameLst>
+                                          <p:attrName>style.visibility</p:attrName>
+                                        </p:attrNameLst>
+                                      </p:cBhvr>
+                                      <p:to>
+                                        <p:strVal val="visible"/>
+                                      </p:to>
+                                    </p:set>
+                                    <p:animEffect transition="in" filter="fade">
+                                      <p:cBhvr>
+                                        <p:cTn id="19" dur="500"/>
+                                        <p:tgtEl>
+                                          <p:spTgt spid="9">
+                                            <p:txEl>
+                                              <p:pRg st="0" end="0"/>
+                                            </p:txEl>
+                                          </p:spTgt>
+                                        </p:tgtEl>
+                                      </p:cBhvr>
+                                    </p:animEffect>
+                                  </p:childTnLst>
+                                </p:cTn>
+                              </p:par>
+                            </p:childTnLst>
+                          </p:cTn>
+                        </p:par>
+                      </p:childTnLst>
+                    </p:cTn>
+                  </p:par>
+                  <p:par>
+                    <p:cTn id="20" fill="hold">
+                      <p:stCondLst>
+                        <p:cond delay="indefinite"/>
+                      </p:stCondLst>
+                      <p:childTnLst>
+                        <p:par>
+                          <p:cTn id="21" fill="hold">
+                            <p:stCondLst>
+                              <p:cond delay="0"/>
+                            </p:stCondLst>
+                            <p:childTnLst>
+                              <p:par>
+                                <p:cTn id="22" presetID="10" presetClass="entr" presetSubtype="0" fill="hold" nodeType="clickEffect">
+                                  <p:stCondLst>
+                                    <p:cond delay="0"/>
+                                  </p:stCondLst>
+                                  <p:childTnLst>
+                                    <p:set>
+                                      <p:cBhvr>
+                                        <p:cTn id="23" dur="1" fill="hold">
+                                          <p:stCondLst>
+                                            <p:cond delay="0"/>
+                                          </p:stCondLst>
+                                        </p:cTn>
+                                        <p:tgtEl>
+                                          <p:spTgt spid="9">
+                                            <p:txEl>
+                                              <p:pRg st="1" end="1"/>
+                                            </p:txEl>
+                                          </p:spTgt>
+                                        </p:tgtEl>
+                                        <p:attrNameLst>
+                                          <p:attrName>style.visibility</p:attrName>
+                                        </p:attrNameLst>
+                                      </p:cBhvr>
+                                      <p:to>
+                                        <p:strVal val="visible"/>
+                                      </p:to>
+                                    </p:set>
+                                    <p:animEffect transition="in" filter="fade">
+                                      <p:cBhvr>
+                                        <p:cTn id="24" dur="500"/>
+                                        <p:tgtEl>
+                                          <p:spTgt spid="9">
+                                            <p:txEl>
+                                              <p:pRg st="1" end="1"/>
+                                            </p:txEl>
+                                          </p:spTgt>
+                                        </p:tgtEl>
+                                      </p:cBhvr>
+                                    </p:animEffect>
+                                  </p:childTnLst>
+                                </p:cTn>
+                              </p:par>
+                            </p:childTnLst>
+                          </p:cTn>
+                        </p:par>
+                      </p:childTnLst>
+                    </p:cTn>
+                  </p:par>
+                </p:childTnLst>
+              </p:cTn>
+              <p:prevCondLst>
+                <p:cond evt="onPrev" delay="0">
+                  <p:tgtEl>
+                    <p:sldTgt/>
+                  </p:tgtEl>
+                </p:cond>
+              </p:prevCondLst>
+              <p:nextCondLst>
+                <p:cond evt="onNext" delay="0">
+                  <p:tgtEl>
+                    <p:sldTgt/>
+                  </p:tgtEl>
+                </p:cond>
+              </p:nextCondLst>
+            </p:seq>
+          </p:childTnLst>
+        </p:cTn>
+      </p:par>
+    </p:tnLst>
+    <p:bldLst>
+      <p:bldP spid="8" grpId="0"/>
+    </p:bldLst>
+  </p:timing>
+</p:sld>
+</file>
+
+<file path=ppt/slides/slide6.xml><?xml version="1.0" encoding="utf-8"?>
+<p:sld xmlns:a="http://schemas.openxmlformats.org/drawingml/2006/main" xmlns:r="http://schemas.openxmlformats.org/officeDocument/2006/relationships" xmlns:p="http://schemas.openxmlformats.org/presentationml/2006/main">
+  <p:cSld>
+    <p:spTree>
+      <p:nvGrpSpPr>
+        <p:cNvPr id="1" name=""/>
+        <p:cNvGrpSpPr/>
+        <p:nvPr/>
+      </p:nvGrpSpPr>
+      <p:grpSpPr>
+        <a:xfrm>
+          <a:off x="0" y="0"/>
+          <a:ext cx="0" cy="0"/>
+          <a:chOff x="0" y="0"/>
+          <a:chExt cx="0" cy="0"/>
+        </a:xfrm>
+      </p:grpSpPr>
+      <p:sp>
+        <p:nvSpPr>
+          <p:cNvPr id="4" name="CasellaDiTesto 3"/>
+          <p:cNvSpPr txBox="1"/>
+          <p:nvPr/>
+        </p:nvSpPr>
+        <p:spPr>
+          <a:xfrm>
+            <a:off x="2538261" y="818606"/>
+            <a:ext cx="7679327" cy="369332"/>
+          </a:xfrm>
+          <a:prstGeom prst="rect">
+            <a:avLst/>
+          </a:prstGeom>
+          <a:noFill/>
+        </p:spPr>
+        <p:txBody>
+          <a:bodyPr wrap="square" rtlCol="0">
+            <a:spAutoFit/>
+          </a:bodyPr>
+          <a:lstStyle/>
+          <a:p>
+            <a:r>
+              <a:rPr lang="en-US" dirty="0" smtClean="0">
+                <a:latin typeface="Georgia" panose="02040502050405020303" pitchFamily="18" charset="0"/>
+              </a:rPr>
+              <a:t>The following registration form appears.</a:t>
+            </a:r>
+            <a:endParaRPr lang="en-US" dirty="0">
+              <a:latin typeface="Georgia" panose="02040502050405020303" pitchFamily="18" charset="0"/>
+            </a:endParaRPr>
+          </a:p>
+        </p:txBody>
+      </p:sp>
+      <p:sp>
+        <p:nvSpPr>
+          <p:cNvPr id="6" name="CasellaDiTesto 5"/>
+          <p:cNvSpPr txBox="1"/>
+          <p:nvPr/>
+        </p:nvSpPr>
+        <p:spPr>
+          <a:xfrm>
+            <a:off x="1942012" y="5978628"/>
+            <a:ext cx="5541902" cy="369332"/>
+          </a:xfrm>
+          <a:prstGeom prst="rect">
+            <a:avLst/>
+          </a:prstGeom>
+          <a:noFill/>
+        </p:spPr>
+        <p:txBody>
+          <a:bodyPr wrap="none" rtlCol="0">
+            <a:spAutoFit/>
+          </a:bodyPr>
+          <a:lstStyle/>
+          <a:p>
+            <a:r>
+              <a:rPr lang="en-US" dirty="0" smtClean="0">
+                <a:latin typeface="Georgia" panose="02040502050405020303" pitchFamily="18" charset="0"/>
+              </a:rPr>
+              <a:t>Luca quickly fills in all the fields and clicks “Submit”.</a:t>
+            </a:r>
+          </a:p>
+        </p:txBody>
+      </p:sp>
+      <p:pic>
+        <p:nvPicPr>
+          <p:cNvPr id="8" name="Segnaposto contenuto 7"/>
+          <p:cNvPicPr>
+            <a:picLocks noGrp="1" noChangeAspect="1"/>
+          </p:cNvPicPr>
+          <p:nvPr>
+            <p:ph idx="1"/>
+          </p:nvPr>
+        </p:nvPicPr>
+        <p:blipFill>
+          <a:blip r:embed="rId2">
+            <a:extLst>
+              <a:ext uri="{28A0092B-C50C-407E-A947-70E740481C1C}">
+                <a14:useLocalDpi xmlns:a14="http://schemas.microsoft.com/office/drawing/2010/main" val="0"/>
+              </a:ext>
+            </a:extLst>
+          </a:blip>
+          <a:stretch>
+            <a:fillRect/>
+          </a:stretch>
+        </p:blipFill>
+        <p:spPr>
+          <a:xfrm>
+            <a:off x="2209571" y="1332956"/>
+            <a:ext cx="5006783" cy="4500654"/>
+          </a:xfrm>
+        </p:spPr>
+      </p:pic>
+    </p:spTree>
+    <p:extLst>
+      <p:ext uri="{BB962C8B-B14F-4D97-AF65-F5344CB8AC3E}">
+        <p14:creationId xmlns:p14="http://schemas.microsoft.com/office/powerpoint/2010/main" val="287342282"/>
+      </p:ext>
+    </p:extLst>
+  </p:cSld>
+  <p:clrMapOvr>
+    <a:masterClrMapping/>
+  </p:clrMapOvr>
+  <p:timing>
+    <p:tnLst>
+      <p:par>
+        <p:cTn id="1" dur="indefinite" restart="never" nodeType="tmRoot">
+          <p:childTnLst>
+            <p:seq concurrent="1" nextAc="seek">
+              <p:cTn id="2" dur="indefinite" nodeType="mainSeq">
+                <p:childTnLst>
+                  <p:par>
+                    <p:cTn id="3" fill="hold">
+                      <p:stCondLst>
+                        <p:cond delay="indefinite"/>
+                      </p:stCondLst>
+                      <p:childTnLst>
+                        <p:par>
+                          <p:cTn id="4" fill="hold">
+                            <p:stCondLst>
+                              <p:cond delay="0"/>
+                            </p:stCondLst>
+                            <p:childTnLst>
+                              <p:par>
+                                <p:cTn id="5" presetID="53" presetClass="entr" presetSubtype="16" fill="hold" nodeType="clickEffect">
+                                  <p:stCondLst>
+                                    <p:cond delay="0"/>
+                                  </p:stCondLst>
+                                  <p:childTnLst>
+                                    <p:set>
+                                      <p:cBhvr>
+                                        <p:cTn id="6" dur="1" fill="hold">
+                                          <p:stCondLst>
+                                            <p:cond delay="0"/>
+                                          </p:stCondLst>
+                                        </p:cTn>
+                                        <p:tgtEl>
+                                          <p:spTgt spid="8"/>
+                                        </p:tgtEl>
+                                        <p:attrNameLst>
+                                          <p:attrName>style.visibility</p:attrName>
+                                        </p:attrNameLst>
+                                      </p:cBhvr>
+                                      <p:to>
+                                        <p:strVal val="visible"/>
+                                      </p:to>
+                                    </p:set>
+                                    <p:anim calcmode="lin" valueType="num">
+                                      <p:cBhvr>
+                                        <p:cTn id="7" dur="500" fill="hold"/>
+                                        <p:tgtEl>
+                                          <p:spTgt spid="8"/>
+                                        </p:tgtEl>
+                                        <p:attrNameLst>
+                                          <p:attrName>ppt_w</p:attrName>
+                                        </p:attrNameLst>
+                                      </p:cBhvr>
+                                      <p:tavLst>
+                                        <p:tav tm="0">
+                                          <p:val>
+                                            <p:fltVal val="0"/>
+                                          </p:val>
+                                        </p:tav>
+                                        <p:tav tm="100000">
+                                          <p:val>
+                                            <p:strVal val="#ppt_w"/>
+                                          </p:val>
+                                        </p:tav>
+                                      </p:tavLst>
+                                    </p:anim>
+                                    <p:anim calcmode="lin" valueType="num">
+                                      <p:cBhvr>
+                                        <p:cTn id="8" dur="500" fill="hold"/>
+                                        <p:tgtEl>
+                                          <p:spTgt spid="8"/>
+                                        </p:tgtEl>
+                                        <p:attrNameLst>
+                                          <p:attrName>ppt_h</p:attrName>
+                                        </p:attrNameLst>
+                                      </p:cBhvr>
+                                      <p:tavLst>
+                                        <p:tav tm="0">
+                                          <p:val>
+                                            <p:fltVal val="0"/>
+                                          </p:val>
+                                        </p:tav>
+                                        <p:tav tm="100000">
+                                          <p:val>
+                                            <p:strVal val="#ppt_h"/>
+                                          </p:val>
+                                        </p:tav>
+                                      </p:tavLst>
+                                    </p:anim>
+                                    <p:animEffect transition="in" filter="fade">
+                                      <p:cBhvr>
+                                        <p:cTn id="9" dur="500"/>
+                                        <p:tgtEl>
+                                          <p:spTgt spid="8"/>
+                                        </p:tgtEl>
+                                      </p:cBhvr>
+                                    </p:animEffect>
+                                  </p:childTnLst>
+                                </p:cTn>
+                              </p:par>
+                            </p:childTnLst>
+                          </p:cTn>
+                        </p:par>
+                      </p:childTnLst>
+                    </p:cTn>
+                  </p:par>
+                  <p:par>
+                    <p:cTn id="10" fill="hold">
+                      <p:stCondLst>
+                        <p:cond delay="indefinite"/>
+                      </p:stCondLst>
+                      <p:childTnLst>
+                        <p:par>
+                          <p:cTn id="11" fill="hold">
+                            <p:stCondLst>
+                              <p:cond delay="0"/>
+                            </p:stCondLst>
+                            <p:childTnLst>
+                              <p:par>
+                                <p:cTn id="12" presetID="10" presetClass="entr" presetSubtype="0" fill="hold" grpId="0" nodeType="clickEffect">
+                                  <p:stCondLst>
+                                    <p:cond delay="0"/>
+                                  </p:stCondLst>
+                                  <p:childTnLst>
+                                    <p:set>
+                                      <p:cBhvr>
+                                        <p:cTn id="13" dur="1" fill="hold">
+                                          <p:stCondLst>
+                                            <p:cond delay="0"/>
+                                          </p:stCondLst>
+                                        </p:cTn>
+                                        <p:tgtEl>
+                                          <p:spTgt spid="6"/>
+                                        </p:tgtEl>
+                                        <p:attrNameLst>
+                                          <p:attrName>style.visibility</p:attrName>
+                                        </p:attrNameLst>
+                                      </p:cBhvr>
+                                      <p:to>
+                                        <p:strVal val="visible"/>
+                                      </p:to>
+                                    </p:set>
+                                    <p:animEffect transition="in" filter="fade">
+                                      <p:cBhvr>
+                                        <p:cTn id="14" dur="500"/>
+                                        <p:tgtEl>
+                                          <p:spTgt spid="6"/>
+                                        </p:tgtEl>
+                                      </p:cBhvr>
+                                    </p:animEffect>
+                                  </p:childTnLst>
+                                </p:cTn>
+                              </p:par>
+                            </p:childTnLst>
+                          </p:cTn>
+                        </p:par>
+                      </p:childTnLst>
+                    </p:cTn>
+                  </p:par>
+                </p:childTnLst>
+              </p:cTn>
+              <p:prevCondLst>
+                <p:cond evt="onPrev" delay="0">
+                  <p:tgtEl>
+                    <p:sldTgt/>
+                  </p:tgtEl>
+                </p:cond>
+              </p:prevCondLst>
+              <p:nextCondLst>
+                <p:cond evt="onNext" delay="0">
+                  <p:tgtEl>
+                    <p:sldTgt/>
+                  </p:tgtEl>
+                </p:cond>
+              </p:nextCondLst>
+            </p:seq>
+          </p:childTnLst>
+        </p:cTn>
+      </p:par>
+    </p:tnLst>
+    <p:bldLst>
+      <p:bldP spid="6" grpId="0"/>
+    </p:bldLst>
+  </p:timing>
+</p:sld>
+</file>
+
+<file path=ppt/slides/slide7.xml><?xml version="1.0" encoding="utf-8"?>
+<p:sld xmlns:a="http://schemas.openxmlformats.org/drawingml/2006/main" xmlns:r="http://schemas.openxmlformats.org/officeDocument/2006/relationships" xmlns:p="http://schemas.openxmlformats.org/presentationml/2006/main">
+  <p:cSld>
+    <p:spTree>
+      <p:nvGrpSpPr>
+        <p:cNvPr id="1" name=""/>
+        <p:cNvGrpSpPr/>
+        <p:nvPr/>
+      </p:nvGrpSpPr>
+      <p:grpSpPr>
+        <a:xfrm>
+          <a:off x="0" y="0"/>
+          <a:ext cx="0" cy="0"/>
+          <a:chOff x="0" y="0"/>
+          <a:chExt cx="0" cy="0"/>
+        </a:xfrm>
+      </p:grpSpPr>
+      <p:pic>
+        <p:nvPicPr>
+          <p:cNvPr id="5" name="Segnaposto contenuto 4"/>
+          <p:cNvPicPr>
+            <a:picLocks noGrp="1" noChangeAspect="1"/>
+          </p:cNvPicPr>
+          <p:nvPr>
+            <p:ph idx="1"/>
+          </p:nvPr>
+        </p:nvPicPr>
+        <p:blipFill>
+          <a:blip r:embed="rId2">
+            <a:extLst>
+              <a:ext uri="{28A0092B-C50C-407E-A947-70E740481C1C}">
+                <a14:useLocalDpi xmlns:a14="http://schemas.microsoft.com/office/drawing/2010/main" val="0"/>
+              </a:ext>
+            </a:extLst>
+          </a:blip>
+          <a:stretch>
+            <a:fillRect/>
+          </a:stretch>
+        </p:blipFill>
+        <p:spPr>
+          <a:xfrm>
+            <a:off x="1625864" y="1620015"/>
+            <a:ext cx="5863507" cy="3933436"/>
+          </a:xfrm>
+        </p:spPr>
+      </p:pic>
+      <p:sp>
+        <p:nvSpPr>
+          <p:cNvPr id="4" name="CasellaDiTesto 3"/>
+          <p:cNvSpPr txBox="1"/>
+          <p:nvPr/>
+        </p:nvSpPr>
+        <p:spPr>
+          <a:xfrm>
+            <a:off x="714103" y="592182"/>
+            <a:ext cx="7801247" cy="923330"/>
+          </a:xfrm>
+          <a:prstGeom prst="rect">
+            <a:avLst/>
+          </a:prstGeom>
+          <a:noFill/>
+        </p:spPr>
+        <p:txBody>
+          <a:bodyPr wrap="square" rtlCol="0">
+            <a:spAutoFit/>
+          </a:bodyPr>
+          <a:lstStyle/>
+          <a:p>
+            <a:r>
+              <a:rPr lang="en-US" dirty="0" smtClean="0">
+                <a:latin typeface="Georgia" panose="02040502050405020303" pitchFamily="18" charset="0"/>
+              </a:rPr>
+              <a:t>A few minutes later, Luca receives an email that confirms his registration. He goes back to MTS’s home, fills in the email and password fields, and logs in. The following screen appears:</a:t>
+            </a:r>
+            <a:endParaRPr lang="en-US" dirty="0">
+              <a:latin typeface="Georgia" panose="02040502050405020303" pitchFamily="18" charset="0"/>
+            </a:endParaRPr>
+          </a:p>
+        </p:txBody>
+      </p:sp>
+      <p:sp>
+        <p:nvSpPr>
+          <p:cNvPr id="7" name="CasellaDiTesto 6"/>
+          <p:cNvSpPr txBox="1"/>
+          <p:nvPr/>
+        </p:nvSpPr>
+        <p:spPr>
+          <a:xfrm>
+            <a:off x="714103" y="5657954"/>
+            <a:ext cx="7933508" cy="646331"/>
+          </a:xfrm>
+          <a:prstGeom prst="rect">
+            <a:avLst/>
+          </a:prstGeom>
+          <a:noFill/>
+        </p:spPr>
+        <p:txBody>
+          <a:bodyPr wrap="square" rtlCol="0">
+            <a:spAutoFit/>
+          </a:bodyPr>
+          <a:lstStyle/>
+          <a:p>
+            <a:r>
+              <a:rPr lang="en-US" dirty="0" smtClean="0">
+                <a:latin typeface="Georgia" panose="02040502050405020303" pitchFamily="18" charset="0"/>
+              </a:rPr>
+              <a:t>The “Reserve a ride” service seems to be suitable to Luca’s needs, so the student clicks on the correspondent button.</a:t>
+            </a:r>
+            <a:endParaRPr lang="en-US" dirty="0">
+              <a:latin typeface="Georgia" panose="02040502050405020303" pitchFamily="18" charset="0"/>
+            </a:endParaRPr>
+          </a:p>
+        </p:txBody>
+      </p:sp>
+    </p:spTree>
+    <p:extLst>
+      <p:ext uri="{BB962C8B-B14F-4D97-AF65-F5344CB8AC3E}">
+        <p14:creationId xmlns:p14="http://schemas.microsoft.com/office/powerpoint/2010/main" val="1899957114"/>
+      </p:ext>
+    </p:extLst>
+  </p:cSld>
+  <p:clrMapOvr>
+    <a:masterClrMapping/>
+  </p:clrMapOvr>
+  <p:timing>
+    <p:tnLst>
+      <p:par>
+        <p:cTn id="1" dur="indefinite" restart="never" nodeType="tmRoot">
+          <p:childTnLst>
+            <p:seq concurrent="1" nextAc="seek">
+              <p:cTn id="2" dur="indefinite" nodeType="mainSeq">
+                <p:childTnLst>
+                  <p:par>
+                    <p:cTn id="3" fill="hold">
+                      <p:stCondLst>
+                        <p:cond delay="indefinite"/>
+                      </p:stCondLst>
+                      <p:childTnLst>
+                        <p:par>
+                          <p:cTn id="4" fill="hold">
+                            <p:stCondLst>
+                              <p:cond delay="0"/>
+                            </p:stCondLst>
+                            <p:childTnLst>
+                              <p:par>
+                                <p:cTn id="5" presetID="53" presetClass="entr" presetSubtype="16" fill="hold" nodeType="clickEffect">
+                                  <p:stCondLst>
+                                    <p:cond delay="0"/>
+                                  </p:stCondLst>
+                                  <p:childTnLst>
+                                    <p:set>
+                                      <p:cBhvr>
+                                        <p:cTn id="6" dur="1" fill="hold">
+                                          <p:stCondLst>
+                                            <p:cond delay="0"/>
+                                          </p:stCondLst>
+                                        </p:cTn>
+                                        <p:tgtEl>
+                                          <p:spTgt spid="5"/>
+                                        </p:tgtEl>
+                                        <p:attrNameLst>
+                                          <p:attrName>style.visibility</p:attrName>
+                                        </p:attrNameLst>
+                                      </p:cBhvr>
+                                      <p:to>
+                                        <p:strVal val="visible"/>
+                                      </p:to>
+                                    </p:set>
+                                    <p:anim calcmode="lin" valueType="num">
+                                      <p:cBhvr>
+                                        <p:cTn id="7" dur="500" fill="hold"/>
+                                        <p:tgtEl>
+                                          <p:spTgt spid="5"/>
+                                        </p:tgtEl>
+                                        <p:attrNameLst>
+                                          <p:attrName>ppt_w</p:attrName>
+                                        </p:attrNameLst>
+                                      </p:cBhvr>
+                                      <p:tavLst>
+                                        <p:tav tm="0">
+                                          <p:val>
+                                            <p:fltVal val="0"/>
+                                          </p:val>
+                                        </p:tav>
+                                        <p:tav tm="100000">
+                                          <p:val>
+                                            <p:strVal val="#ppt_w"/>
+                                          </p:val>
+                                        </p:tav>
+                                      </p:tavLst>
+                                    </p:anim>
+                                    <p:anim calcmode="lin" valueType="num">
+                                      <p:cBhvr>
+                                        <p:cTn id="8" dur="500" fill="hold"/>
+                                        <p:tgtEl>
+                                          <p:spTgt spid="5"/>
+                                        </p:tgtEl>
+                                        <p:attrNameLst>
+                                          <p:attrName>ppt_h</p:attrName>
+                                        </p:attrNameLst>
+                                      </p:cBhvr>
+                                      <p:tavLst>
+                                        <p:tav tm="0">
+                                          <p:val>
+                                            <p:fltVal val="0"/>
+                                          </p:val>
+                                        </p:tav>
+                                        <p:tav tm="100000">
+                                          <p:val>
+                                            <p:strVal val="#ppt_h"/>
+                                          </p:val>
+                                        </p:tav>
+                                      </p:tavLst>
+                                    </p:anim>
+                                    <p:animEffect transition="in" filter="fade">
+                                      <p:cBhvr>
+                                        <p:cTn id="9" dur="500"/>
+                                        <p:tgtEl>
+                                          <p:spTgt spid="5"/>
+                                        </p:tgtEl>
+                                      </p:cBhvr>
+                                    </p:animEffect>
+                                  </p:childTnLst>
+                                </p:cTn>
+                              </p:par>
+                            </p:childTnLst>
+                          </p:cTn>
+                        </p:par>
+                      </p:childTnLst>
+                    </p:cTn>
+                  </p:par>
+                  <p:par>
+                    <p:cTn id="10" fill="hold">
+                      <p:stCondLst>
+                        <p:cond delay="indefinite"/>
+                      </p:stCondLst>
+                      <p:childTnLst>
+                        <p:par>
+                          <p:cTn id="11" fill="hold">
+                            <p:stCondLst>
+                              <p:cond delay="0"/>
+                            </p:stCondLst>
+                            <p:childTnLst>
+                              <p:par>
+                                <p:cTn id="12" presetID="10" presetClass="entr" presetSubtype="0" fill="hold" grpId="0" nodeType="clickEffect">
+                                  <p:stCondLst>
+                                    <p:cond delay="0"/>
+                                  </p:stCondLst>
+                                  <p:childTnLst>
+                                    <p:set>
+                                      <p:cBhvr>
+                                        <p:cTn id="13" dur="1" fill="hold">
+                                          <p:stCondLst>
+                                            <p:cond delay="0"/>
+                                          </p:stCondLst>
+                                        </p:cTn>
+                                        <p:tgtEl>
+                                          <p:spTgt spid="7"/>
+                                        </p:tgtEl>
+                                        <p:attrNameLst>
+                                          <p:attrName>style.visibility</p:attrName>
+                                        </p:attrNameLst>
+                                      </p:cBhvr>
+                                      <p:to>
+                                        <p:strVal val="visible"/>
+                                      </p:to>
+                                    </p:set>
+                                    <p:animEffect transition="in" filter="fade">
+                                      <p:cBhvr>
+                                        <p:cTn id="14" dur="500"/>
+                                        <p:tgtEl>
+                                          <p:spTgt spid="7"/>
+                                        </p:tgtEl>
+                                      </p:cBhvr>
+                                    </p:animEffect>
+                                  </p:childTnLst>
+                                </p:cTn>
+                              </p:par>
+                            </p:childTnLst>
+                          </p:cTn>
+                        </p:par>
+                      </p:childTnLst>
+                    </p:cTn>
+                  </p:par>
+                </p:childTnLst>
+              </p:cTn>
+              <p:prevCondLst>
+                <p:cond evt="onPrev" delay="0">
+                  <p:tgtEl>
+                    <p:sldTgt/>
+                  </p:tgtEl>
+                </p:cond>
+              </p:prevCondLst>
+              <p:nextCondLst>
+                <p:cond evt="onNext" delay="0">
+                  <p:tgtEl>
+                    <p:sldTgt/>
+                  </p:tgtEl>
+                </p:cond>
+              </p:nextCondLst>
+            </p:seq>
+          </p:childTnLst>
+        </p:cTn>
+      </p:par>
+    </p:tnLst>
+    <p:bldLst>
+      <p:bldP spid="7" grpId="0"/>
+    </p:bldLst>
+  </p:timing>
+</p:sld>
+</file>
+
+<file path=ppt/slides/slide8.xml><?xml version="1.0" encoding="utf-8"?>
+<p:sld xmlns:a="http://schemas.openxmlformats.org/drawingml/2006/main" xmlns:r="http://schemas.openxmlformats.org/officeDocument/2006/relationships" xmlns:p="http://schemas.openxmlformats.org/presentationml/2006/main">
+  <p:cSld>
+    <p:spTree>
+      <p:nvGrpSpPr>
+        <p:cNvPr id="1" name=""/>
+        <p:cNvGrpSpPr/>
+        <p:nvPr/>
+      </p:nvGrpSpPr>
+      <p:grpSpPr>
+        <a:xfrm>
+          <a:off x="0" y="0"/>
+          <a:ext cx="0" cy="0"/>
+          <a:chOff x="0" y="0"/>
+          <a:chExt cx="0" cy="0"/>
+        </a:xfrm>
+      </p:grpSpPr>
+      <p:pic>
+        <p:nvPicPr>
+          <p:cNvPr id="4" name="Segnaposto contenuto 3"/>
+          <p:cNvPicPr>
+            <a:picLocks noGrp="1" noChangeAspect="1"/>
+          </p:cNvPicPr>
+          <p:nvPr>
+            <p:ph idx="1"/>
+          </p:nvPr>
+        </p:nvPicPr>
+        <p:blipFill>
+          <a:blip r:embed="rId2">
+            <a:extLst>
+              <a:ext uri="{28A0092B-C50C-407E-A947-70E740481C1C}">
+                <a14:useLocalDpi xmlns:a14="http://schemas.microsoft.com/office/drawing/2010/main" val="0"/>
+              </a:ext>
+            </a:extLst>
+          </a:blip>
+          <a:stretch>
+            <a:fillRect/>
+          </a:stretch>
+        </p:blipFill>
+        <p:spPr>
+          <a:xfrm>
+            <a:off x="1914516" y="1337947"/>
+            <a:ext cx="5262714" cy="4250654"/>
+          </a:xfrm>
+        </p:spPr>
+      </p:pic>
+      <p:sp>
+        <p:nvSpPr>
+          <p:cNvPr id="5" name="CasellaDiTesto 4"/>
+          <p:cNvSpPr txBox="1"/>
+          <p:nvPr/>
+        </p:nvSpPr>
+        <p:spPr>
+          <a:xfrm>
+            <a:off x="1359745" y="792480"/>
+            <a:ext cx="6372257" cy="369332"/>
+          </a:xfrm>
+          <a:prstGeom prst="rect">
+            <a:avLst/>
+          </a:prstGeom>
+          <a:noFill/>
+        </p:spPr>
+        <p:txBody>
+          <a:bodyPr wrap="none" rtlCol="0">
+            <a:spAutoFit/>
+          </a:bodyPr>
+          <a:lstStyle/>
+          <a:p>
+            <a:r>
+              <a:rPr lang="en-US" dirty="0" smtClean="0">
+                <a:latin typeface="Georgia" panose="02040502050405020303" pitchFamily="18" charset="0"/>
+              </a:rPr>
+              <a:t>Luca compiles the following form with required information.</a:t>
+            </a:r>
+            <a:endParaRPr lang="en-US" dirty="0">
+              <a:latin typeface="Georgia" panose="02040502050405020303" pitchFamily="18" charset="0"/>
+            </a:endParaRPr>
+          </a:p>
+        </p:txBody>
+      </p:sp>
+      <p:sp>
+        <p:nvSpPr>
+          <p:cNvPr id="6" name="CasellaDiTesto 5"/>
+          <p:cNvSpPr txBox="1"/>
+          <p:nvPr/>
+        </p:nvSpPr>
+        <p:spPr>
+          <a:xfrm>
+            <a:off x="1268280" y="5764736"/>
+            <a:ext cx="7466417" cy="646331"/>
+          </a:xfrm>
+          <a:prstGeom prst="rect">
+            <a:avLst/>
+          </a:prstGeom>
+          <a:noFill/>
+        </p:spPr>
+        <p:txBody>
+          <a:bodyPr wrap="square" rtlCol="0">
+            <a:spAutoFit/>
+          </a:bodyPr>
+          <a:lstStyle/>
+          <a:p>
+            <a:r>
+              <a:rPr lang="en-US" dirty="0" smtClean="0">
+                <a:latin typeface="Georgia" panose="02040502050405020303" pitchFamily="18" charset="0"/>
+              </a:rPr>
+              <a:t>He presses the “Submit” button, and shortly after a pop-up confirms that his reservation has been accepted by the system.</a:t>
+            </a:r>
+            <a:endParaRPr lang="en-US" dirty="0">
+              <a:latin typeface="Georgia" panose="02040502050405020303" pitchFamily="18" charset="0"/>
+            </a:endParaRPr>
+          </a:p>
+        </p:txBody>
+      </p:sp>
+    </p:spTree>
+    <p:extLst>
+      <p:ext uri="{BB962C8B-B14F-4D97-AF65-F5344CB8AC3E}">
+        <p14:creationId xmlns:p14="http://schemas.microsoft.com/office/powerpoint/2010/main" val="1256500361"/>
+      </p:ext>
+    </p:extLst>
+  </p:cSld>
+  <p:clrMapOvr>
+    <a:masterClrMapping/>
+  </p:clrMapOvr>
+  <p:timing>
+    <p:tnLst>
+      <p:par>
+        <p:cTn id="1" dur="indefinite" restart="never" nodeType="tmRoot">
+          <p:childTnLst>
+            <p:seq concurrent="1" nextAc="seek">
+              <p:cTn id="2" dur="indefinite" nodeType="mainSeq">
+                <p:childTnLst>
+                  <p:par>
+                    <p:cTn id="3" fill="hold">
+                      <p:stCondLst>
+                        <p:cond delay="indefinite"/>
+                      </p:stCondLst>
+                      <p:childTnLst>
+                        <p:par>
+                          <p:cTn id="4" fill="hold">
+                            <p:stCondLst>
+                              <p:cond delay="0"/>
+                            </p:stCondLst>
+                            <p:childTnLst>
+                              <p:par>
+                                <p:cTn id="5" presetID="53" presetClass="entr" presetSubtype="16" fill="hold" nodeType="clickEffect">
+                                  <p:stCondLst>
+                                    <p:cond delay="0"/>
+                                  </p:stCondLst>
+                                  <p:childTnLst>
+                                    <p:set>
+                                      <p:cBhvr>
+                                        <p:cTn id="6" dur="1" fill="hold">
+                                          <p:stCondLst>
+                                            <p:cond delay="0"/>
+                                          </p:stCondLst>
+                                        </p:cTn>
+                                        <p:tgtEl>
+                                          <p:spTgt spid="4"/>
+                                        </p:tgtEl>
+                                        <p:attrNameLst>
+                                          <p:attrName>style.visibility</p:attrName>
+                                        </p:attrNameLst>
+                                      </p:cBhvr>
+                                      <p:to>
+                                        <p:strVal val="visible"/>
+                                      </p:to>
+                                    </p:set>
+                                    <p:anim calcmode="lin" valueType="num">
+                                      <p:cBhvr>
+                                        <p:cTn id="7" dur="500" fill="hold"/>
+                                        <p:tgtEl>
+                                          <p:spTgt spid="4"/>
+                                        </p:tgtEl>
+                                        <p:attrNameLst>
+                                          <p:attrName>ppt_w</p:attrName>
+                                        </p:attrNameLst>
+                                      </p:cBhvr>
+                                      <p:tavLst>
+                                        <p:tav tm="0">
+                                          <p:val>
+                                            <p:fltVal val="0"/>
+                                          </p:val>
+                                        </p:tav>
+                                        <p:tav tm="100000">
+                                          <p:val>
+                                            <p:strVal val="#ppt_w"/>
+                                          </p:val>
+                                        </p:tav>
+                                      </p:tavLst>
+                                    </p:anim>
+                                    <p:anim calcmode="lin" valueType="num">
+                                      <p:cBhvr>
+                                        <p:cTn id="8" dur="500" fill="hold"/>
+                                        <p:tgtEl>
+                                          <p:spTgt spid="4"/>
+                                        </p:tgtEl>
+                                        <p:attrNameLst>
+                                          <p:attrName>ppt_h</p:attrName>
+                                        </p:attrNameLst>
+                                      </p:cBhvr>
+                                      <p:tavLst>
+                                        <p:tav tm="0">
+                                          <p:val>
+                                            <p:fltVal val="0"/>
+                                          </p:val>
+                                        </p:tav>
+                                        <p:tav tm="100000">
+                                          <p:val>
+                                            <p:strVal val="#ppt_h"/>
+                                          </p:val>
+                                        </p:tav>
+                                      </p:tavLst>
+                                    </p:anim>
+                                    <p:animEffect transition="in" filter="fade">
+                                      <p:cBhvr>
+                                        <p:cTn id="9" dur="500"/>
+                                        <p:tgtEl>
+                                          <p:spTgt spid="4"/>
+                                        </p:tgtEl>
+                                      </p:cBhvr>
+                                    </p:animEffect>
+                                  </p:childTnLst>
+                                </p:cTn>
+                              </p:par>
+                            </p:childTnLst>
+                          </p:cTn>
+                        </p:par>
+                      </p:childTnLst>
+                    </p:cTn>
+                  </p:par>
+                  <p:par>
+                    <p:cTn id="10" fill="hold">
+                      <p:stCondLst>
+                        <p:cond delay="indefinite"/>
+                      </p:stCondLst>
+                      <p:childTnLst>
+                        <p:par>
+                          <p:cTn id="11" fill="hold">
+                            <p:stCondLst>
+                              <p:cond delay="0"/>
+                            </p:stCondLst>
+                            <p:childTnLst>
+                              <p:par>
+                                <p:cTn id="12" presetID="10" presetClass="entr" presetSubtype="0" fill="hold" grpId="0" nodeType="clickEffect">
+                                  <p:stCondLst>
+                                    <p:cond delay="0"/>
+                                  </p:stCondLst>
+                                  <p:childTnLst>
+                                    <p:set>
+                                      <p:cBhvr>
+                                        <p:cTn id="13" dur="1" fill="hold">
+                                          <p:stCondLst>
+                                            <p:cond delay="0"/>
+                                          </p:stCondLst>
+                                        </p:cTn>
+                                        <p:tgtEl>
+                                          <p:spTgt spid="6"/>
+                                        </p:tgtEl>
+                                        <p:attrNameLst>
+                                          <p:attrName>style.visibility</p:attrName>
+                                        </p:attrNameLst>
+                                      </p:cBhvr>
+                                      <p:to>
+                                        <p:strVal val="visible"/>
+                                      </p:to>
+                                    </p:set>
+                                    <p:animEffect transition="in" filter="fade">
+                                      <p:cBhvr>
+                                        <p:cTn id="14" dur="500"/>
+                                        <p:tgtEl>
+                                          <p:spTgt spid="6"/>
+                                        </p:tgtEl>
+                                      </p:cBhvr>
+                                    </p:animEffect>
+                                  </p:childTnLst>
+                                </p:cTn>
+                              </p:par>
+                            </p:childTnLst>
+                          </p:cTn>
+                        </p:par>
+                      </p:childTnLst>
+                    </p:cTn>
+                  </p:par>
+                </p:childTnLst>
+              </p:cTn>
+              <p:prevCondLst>
+                <p:cond evt="onPrev" delay="0">
+                  <p:tgtEl>
+                    <p:sldTgt/>
+                  </p:tgtEl>
+                </p:cond>
+              </p:prevCondLst>
+              <p:nextCondLst>
+                <p:cond evt="onNext" delay="0">
+                  <p:tgtEl>
+                    <p:sldTgt/>
+                  </p:tgtEl>
+                </p:cond>
+              </p:nextCondLst>
+            </p:seq>
+          </p:childTnLst>
+        </p:cTn>
+      </p:par>
+    </p:tnLst>
+    <p:bldLst>
+      <p:bldP spid="6" grpId="0"/>
+    </p:bldLst>
+  </p:timing>
+</p:sld>
+</file>
+
+<file path=ppt/slides/slide9.xml><?xml version="1.0" encoding="utf-8"?>
+<p:sld xmlns:a="http://schemas.openxmlformats.org/drawingml/2006/main" xmlns:r="http://schemas.openxmlformats.org/officeDocument/2006/relationships" xmlns:p="http://schemas.openxmlformats.org/presentationml/2006/main">
+  <p:cSld>
+    <p:spTree>
+      <p:nvGrpSpPr>
+        <p:cNvPr id="1" name=""/>
+        <p:cNvGrpSpPr/>
+        <p:nvPr/>
+      </p:nvGrpSpPr>
+      <p:grpSpPr>
+        <a:xfrm>
+          <a:off x="0" y="0"/>
+          <a:ext cx="0" cy="0"/>
+          <a:chOff x="0" y="0"/>
+          <a:chExt cx="0" cy="0"/>
+        </a:xfrm>
+      </p:grpSpPr>
+      <p:pic>
+        <p:nvPicPr>
+          <p:cNvPr id="6" name="Segnaposto contenuto 5"/>
+          <p:cNvPicPr>
+            <a:picLocks noGrp="1" noChangeAspect="1"/>
+          </p:cNvPicPr>
+          <p:nvPr>
+            <p:ph idx="1"/>
+          </p:nvPr>
+        </p:nvPicPr>
+        <p:blipFill>
+          <a:blip r:embed="rId2">
+            <a:extLst>
+              <a:ext uri="{28A0092B-C50C-407E-A947-70E740481C1C}">
+                <a14:useLocalDpi xmlns:a14="http://schemas.microsoft.com/office/drawing/2010/main" val="0"/>
+              </a:ext>
+            </a:extLst>
+          </a:blip>
+          <a:stretch>
+            <a:fillRect/>
+          </a:stretch>
+        </p:blipFill>
+        <p:spPr>
+          <a:xfrm>
+            <a:off x="745399" y="1700767"/>
+            <a:ext cx="7886700" cy="3730195"/>
+          </a:xfrm>
+        </p:spPr>
+      </p:pic>
+      <p:sp>
+        <p:nvSpPr>
+          <p:cNvPr id="7" name="CasellaDiTesto 6"/>
+          <p:cNvSpPr txBox="1"/>
+          <p:nvPr/>
+        </p:nvSpPr>
+        <p:spPr>
+          <a:xfrm>
+            <a:off x="862149" y="635726"/>
+            <a:ext cx="7653201" cy="646331"/>
+          </a:xfrm>
+          <a:prstGeom prst="rect">
+            <a:avLst/>
+          </a:prstGeom>
+          <a:noFill/>
+        </p:spPr>
+        <p:txBody>
+          <a:bodyPr wrap="square" rtlCol="0">
+            <a:spAutoFit/>
+          </a:bodyPr>
+          <a:lstStyle/>
+          <a:p>
+            <a:r>
+              <a:rPr lang="en-US" dirty="0" smtClean="0">
+                <a:latin typeface="Georgia" panose="02040502050405020303" pitchFamily="18" charset="0"/>
+              </a:rPr>
+              <a:t>Using the “Show your history” function, Luca has another confirmation that his reservation has been regularly taken care by the system.</a:t>
+            </a:r>
+            <a:endParaRPr lang="en-US" dirty="0">
+              <a:latin typeface="Georgia" panose="02040502050405020303" pitchFamily="18" charset="0"/>
+            </a:endParaRPr>
+          </a:p>
+        </p:txBody>
+      </p:sp>
+      <p:sp>
+        <p:nvSpPr>
+          <p:cNvPr id="8" name="CasellaDiTesto 7"/>
+          <p:cNvSpPr txBox="1"/>
+          <p:nvPr/>
+        </p:nvSpPr>
+        <p:spPr>
+          <a:xfrm>
+            <a:off x="1250147" y="5665006"/>
+            <a:ext cx="6877204" cy="369332"/>
+          </a:xfrm>
+          <a:prstGeom prst="rect">
+            <a:avLst/>
+          </a:prstGeom>
+          <a:noFill/>
+        </p:spPr>
+        <p:txBody>
+          <a:bodyPr wrap="none" rtlCol="0">
+            <a:spAutoFit/>
+          </a:bodyPr>
+          <a:lstStyle/>
+          <a:p>
+            <a:r>
+              <a:rPr lang="en-US" dirty="0" smtClean="0">
+                <a:latin typeface="Georgia" panose="02040502050405020303" pitchFamily="18" charset="0"/>
+              </a:rPr>
+              <a:t>He notice also that he has the possibility to delete the reservation</a:t>
+            </a:r>
+            <a:r>
+              <a:rPr lang="en-US" dirty="0" smtClean="0"/>
+              <a:t>.</a:t>
+            </a:r>
+            <a:endParaRPr lang="en-US" dirty="0"/>
+          </a:p>
+        </p:txBody>
+      </p:sp>
+    </p:spTree>
+    <p:extLst>
+      <p:ext uri="{BB962C8B-B14F-4D97-AF65-F5344CB8AC3E}">
+        <p14:creationId xmlns:p14="http://schemas.microsoft.com/office/powerpoint/2010/main" val="1230638344"/>
+      </p:ext>
+    </p:extLst>
+  </p:cSld>
+  <p:clrMapOvr>
+    <a:masterClrMapping/>
+  </p:clrMapOvr>
+  <p:timing>
+    <p:tnLst>
+      <p:par>
+        <p:cTn id="1" dur="indefinite" restart="never" nodeType="tmRoot">
+          <p:childTnLst>
+            <p:seq concurrent="1" nextAc="seek">
+              <p:cTn id="2" dur="indefinite" nodeType="mainSeq">
+                <p:childTnLst>
+                  <p:par>
+                    <p:cTn id="3" fill="hold">
+                      <p:stCondLst>
+                        <p:cond delay="indefinite"/>
+                      </p:stCondLst>
+                      <p:childTnLst>
+                        <p:par>
+                          <p:cTn id="4" fill="hold">
+                            <p:stCondLst>
+                              <p:cond delay="0"/>
+                            </p:stCondLst>
+                            <p:childTnLst>
+                              <p:par>
+                                <p:cTn id="5" presetID="53" presetClass="entr" presetSubtype="16" fill="hold" nodeType="clickEffect">
+                                  <p:stCondLst>
+                                    <p:cond delay="0"/>
+                                  </p:stCondLst>
+                                  <p:childTnLst>
+                                    <p:set>
+                                      <p:cBhvr>
+                                        <p:cTn id="6" dur="1" fill="hold">
+                                          <p:stCondLst>
+                                            <p:cond delay="0"/>
+                                          </p:stCondLst>
+                                        </p:cTn>
+                                        <p:tgtEl>
+                                          <p:spTgt spid="6"/>
+                                        </p:tgtEl>
+                                        <p:attrNameLst>
+                                          <p:attrName>style.visibility</p:attrName>
+                                        </p:attrNameLst>
+                                      </p:cBhvr>
+                                      <p:to>
+                                        <p:strVal val="visible"/>
+                                      </p:to>
+                                    </p:set>
+                                    <p:anim calcmode="lin" valueType="num">
+                                      <p:cBhvr>
+                                        <p:cTn id="7" dur="500" fill="hold"/>
+                                        <p:tgtEl>
+                                          <p:spTgt spid="6"/>
+                                        </p:tgtEl>
+                                        <p:attrNameLst>
+                                          <p:attrName>ppt_w</p:attrName>
+                                        </p:attrNameLst>
+                                      </p:cBhvr>
+                                      <p:tavLst>
+                                        <p:tav tm="0">
+                                          <p:val>
+                                            <p:fltVal val="0"/>
+                                          </p:val>
+                                        </p:tav>
+                                        <p:tav tm="100000">
+                                          <p:val>
+                                            <p:strVal val="#ppt_w"/>
+                                          </p:val>
+                                        </p:tav>
+                                      </p:tavLst>
+                                    </p:anim>
+                                    <p:anim calcmode="lin" valueType="num">
+                                      <p:cBhvr>
+                                        <p:cTn id="8" dur="500" fill="hold"/>
+                                        <p:tgtEl>
+                                          <p:spTgt spid="6"/>
+                                        </p:tgtEl>
+                                        <p:attrNameLst>
+                                          <p:attrName>ppt_h</p:attrName>
+                                        </p:attrNameLst>
+                                      </p:cBhvr>
+                                      <p:tavLst>
+                                        <p:tav tm="0">
+                                          <p:val>
+                                            <p:fltVal val="0"/>
+                                          </p:val>
+                                        </p:tav>
+                                        <p:tav tm="100000">
+                                          <p:val>
+                                            <p:strVal val="#ppt_h"/>
+                                          </p:val>
+                                        </p:tav>
+                                      </p:tavLst>
+                                    </p:anim>
+                                    <p:animEffect transition="in" filter="fade">
+                                      <p:cBhvr>
+                                        <p:cTn id="9" dur="500"/>
+                                        <p:tgtEl>
+                                          <p:spTgt spid="6"/>
+                                        </p:tgtEl>
+                                      </p:cBhvr>
+                                    </p:animEffect>
+                                  </p:childTnLst>
+                                </p:cTn>
+                              </p:par>
+                            </p:childTnLst>
+                          </p:cTn>
+                        </p:par>
+                      </p:childTnLst>
+                    </p:cTn>
+                  </p:par>
+                  <p:par>
+                    <p:cTn id="10" fill="hold">
+                      <p:stCondLst>
+                        <p:cond delay="indefinite"/>
+                      </p:stCondLst>
+                      <p:childTnLst>
+                        <p:par>
+                          <p:cTn id="11" fill="hold">
+                            <p:stCondLst>
+                              <p:cond delay="0"/>
+                            </p:stCondLst>
+                            <p:childTnLst>
+                              <p:par>
+                                <p:cTn id="12" presetID="10" presetClass="entr" presetSubtype="0" fill="hold" grpId="0" nodeType="clickEffect">
+                                  <p:stCondLst>
+                                    <p:cond delay="0"/>
+                                  </p:stCondLst>
+                                  <p:childTnLst>
+                                    <p:set>
+                                      <p:cBhvr>
+                                        <p:cTn id="13" dur="1" fill="hold">
+                                          <p:stCondLst>
+                                            <p:cond delay="0"/>
+                                          </p:stCondLst>
+                                        </p:cTn>
+                                        <p:tgtEl>
+                                          <p:spTgt spid="8"/>
+                                        </p:tgtEl>
+                                        <p:attrNameLst>
+                                          <p:attrName>style.visibility</p:attrName>
+                                        </p:attrNameLst>
+                                      </p:cBhvr>
+                                      <p:to>
+                                        <p:strVal val="visible"/>
+                                      </p:to>
+                                    </p:set>
+                                    <p:animEffect transition="in" filter="fade">
+                                      <p:cBhvr>
+                                        <p:cTn id="14" dur="500"/>
+                                        <p:tgtEl>
+                                          <p:spTgt spid="8"/>
+                                        </p:tgtEl>
+                                      </p:cBhvr>
+                                    </p:animEffect>
+                                  </p:childTnLst>
+                                </p:cTn>
+                              </p:par>
+                            </p:childTnLst>
+                          </p:cTn>
+                        </p:par>
+                      </p:childTnLst>
+                    </p:cTn>
+                  </p:par>
+                </p:childTnLst>
+              </p:cTn>
+              <p:prevCondLst>
+                <p:cond evt="onPrev" delay="0">
+                  <p:tgtEl>
+                    <p:sldTgt/>
+                  </p:tgtEl>
+                </p:cond>
+              </p:prevCondLst>
+              <p:nextCondLst>
+                <p:cond evt="onNext" delay="0">
+                  <p:tgtEl>
+                    <p:sldTgt/>
+                  </p:tgtEl>
+                </p:cond>
+              </p:nextCondLst>
+            </p:seq>
+          </p:childTnLst>
+        </p:cTn>
+      </p:par>
+    </p:tnLst>
+    <p:bldLst>
+      <p:bldP spid="8" grpId="0"/>
+    </p:bldLst>
   </p:timing>
 </p:sld>
 </file>

</xml_diff>